<commit_message>
More on the versioning part.
</commit_message>
<xml_diff>
--- a/Pikcio_tokens.pptx
+++ b/Pikcio_tokens.pptx
@@ -18,6 +18,8 @@
     <p:sldId id="260" r:id="rId12"/>
     <p:sldId id="261" r:id="rId13"/>
     <p:sldId id="262" r:id="rId14"/>
+    <p:sldId id="270" r:id="rId15"/>
+    <p:sldId id="271" r:id="rId16"/>
   </p:sldIdLst>
   <p:sldSz cx="12192000" cy="6858000"/>
   <p:notesSz cx="6858000" cy="9144000"/>
@@ -271,7 +273,7 @@
           <a:p>
             <a:fld id="{3B3A7B9A-38C2-40F8-BF0C-E69FC542A6B2}" type="datetimeFigureOut">
               <a:rPr lang="fr-FR" smtClean="0"/>
-              <a:t>13/09/2018</a:t>
+              <a:t>27/09/2018</a:t>
             </a:fld>
             <a:endParaRPr lang="fr-FR"/>
           </a:p>
@@ -469,7 +471,7 @@
           <a:p>
             <a:fld id="{3B3A7B9A-38C2-40F8-BF0C-E69FC542A6B2}" type="datetimeFigureOut">
               <a:rPr lang="fr-FR" smtClean="0"/>
-              <a:t>13/09/2018</a:t>
+              <a:t>27/09/2018</a:t>
             </a:fld>
             <a:endParaRPr lang="fr-FR"/>
           </a:p>
@@ -677,7 +679,7 @@
           <a:p>
             <a:fld id="{3B3A7B9A-38C2-40F8-BF0C-E69FC542A6B2}" type="datetimeFigureOut">
               <a:rPr lang="fr-FR" smtClean="0"/>
-              <a:t>13/09/2018</a:t>
+              <a:t>27/09/2018</a:t>
             </a:fld>
             <a:endParaRPr lang="fr-FR"/>
           </a:p>
@@ -875,7 +877,7 @@
           <a:p>
             <a:fld id="{3B3A7B9A-38C2-40F8-BF0C-E69FC542A6B2}" type="datetimeFigureOut">
               <a:rPr lang="fr-FR" smtClean="0"/>
-              <a:t>13/09/2018</a:t>
+              <a:t>27/09/2018</a:t>
             </a:fld>
             <a:endParaRPr lang="fr-FR"/>
           </a:p>
@@ -1150,7 +1152,7 @@
           <a:p>
             <a:fld id="{3B3A7B9A-38C2-40F8-BF0C-E69FC542A6B2}" type="datetimeFigureOut">
               <a:rPr lang="fr-FR" smtClean="0"/>
-              <a:t>13/09/2018</a:t>
+              <a:t>27/09/2018</a:t>
             </a:fld>
             <a:endParaRPr lang="fr-FR"/>
           </a:p>
@@ -1415,7 +1417,7 @@
           <a:p>
             <a:fld id="{3B3A7B9A-38C2-40F8-BF0C-E69FC542A6B2}" type="datetimeFigureOut">
               <a:rPr lang="fr-FR" smtClean="0"/>
-              <a:t>13/09/2018</a:t>
+              <a:t>27/09/2018</a:t>
             </a:fld>
             <a:endParaRPr lang="fr-FR"/>
           </a:p>
@@ -1827,7 +1829,7 @@
           <a:p>
             <a:fld id="{3B3A7B9A-38C2-40F8-BF0C-E69FC542A6B2}" type="datetimeFigureOut">
               <a:rPr lang="fr-FR" smtClean="0"/>
-              <a:t>13/09/2018</a:t>
+              <a:t>27/09/2018</a:t>
             </a:fld>
             <a:endParaRPr lang="fr-FR"/>
           </a:p>
@@ -1968,7 +1970,7 @@
           <a:p>
             <a:fld id="{3B3A7B9A-38C2-40F8-BF0C-E69FC542A6B2}" type="datetimeFigureOut">
               <a:rPr lang="fr-FR" smtClean="0"/>
-              <a:t>13/09/2018</a:t>
+              <a:t>27/09/2018</a:t>
             </a:fld>
             <a:endParaRPr lang="fr-FR"/>
           </a:p>
@@ -2081,7 +2083,7 @@
           <a:p>
             <a:fld id="{3B3A7B9A-38C2-40F8-BF0C-E69FC542A6B2}" type="datetimeFigureOut">
               <a:rPr lang="fr-FR" smtClean="0"/>
-              <a:t>13/09/2018</a:t>
+              <a:t>27/09/2018</a:t>
             </a:fld>
             <a:endParaRPr lang="fr-FR"/>
           </a:p>
@@ -2392,7 +2394,7 @@
           <a:p>
             <a:fld id="{3B3A7B9A-38C2-40F8-BF0C-E69FC542A6B2}" type="datetimeFigureOut">
               <a:rPr lang="fr-FR" smtClean="0"/>
-              <a:t>13/09/2018</a:t>
+              <a:t>27/09/2018</a:t>
             </a:fld>
             <a:endParaRPr lang="fr-FR"/>
           </a:p>
@@ -2680,7 +2682,7 @@
           <a:p>
             <a:fld id="{3B3A7B9A-38C2-40F8-BF0C-E69FC542A6B2}" type="datetimeFigureOut">
               <a:rPr lang="fr-FR" smtClean="0"/>
-              <a:t>13/09/2018</a:t>
+              <a:t>27/09/2018</a:t>
             </a:fld>
             <a:endParaRPr lang="fr-FR"/>
           </a:p>
@@ -2921,7 +2923,7 @@
           <a:p>
             <a:fld id="{3B3A7B9A-38C2-40F8-BF0C-E69FC542A6B2}" type="datetimeFigureOut">
               <a:rPr lang="fr-FR" smtClean="0"/>
-              <a:t>13/09/2018</a:t>
+              <a:t>27/09/2018</a:t>
             </a:fld>
             <a:endParaRPr lang="fr-FR"/>
           </a:p>
@@ -3432,7 +3434,7 @@
         <p:spPr bwMode="auto">
           <a:xfrm>
             <a:off x="1031845" y="1363424"/>
-            <a:ext cx="7306812" cy="2998513"/>
+            <a:ext cx="7306812" cy="3862339"/>
           </a:xfrm>
           <a:prstGeom prst="rect">
             <a:avLst/>
@@ -3845,6 +3847,105 @@
                 <a:cs typeface="Arial" panose="020B0604020202020204" pitchFamily="34" charset="0"/>
               </a:rPr>
               <a:t> module</a:t>
+            </a:r>
+          </a:p>
+          <a:p>
+            <a:pPr marL="342900" indent="-342900" algn="just">
+              <a:lnSpc>
+                <a:spcPct val="107000"/>
+              </a:lnSpc>
+              <a:spcAft>
+                <a:spcPts val="800"/>
+              </a:spcAft>
+              <a:buFont typeface="+mj-lt"/>
+              <a:buAutoNum type="arabicPeriod"/>
+            </a:pPr>
+            <a:r>
+              <a:rPr lang="fr-FR" sz="2000" dirty="0">
+                <a:solidFill>
+                  <a:schemeClr val="tx1">
+                    <a:lumMod val="65000"/>
+                    <a:lumOff val="35000"/>
+                  </a:schemeClr>
+                </a:solidFill>
+                <a:ea typeface="Calibri" panose="020F0502020204030204" pitchFamily="34" charset="0"/>
+                <a:cs typeface="Arial" panose="020B0604020202020204" pitchFamily="34" charset="0"/>
+              </a:rPr>
+              <a:t>Minimal </a:t>
+            </a:r>
+            <a:r>
+              <a:rPr lang="fr-FR" sz="2000" dirty="0" err="1">
+                <a:solidFill>
+                  <a:schemeClr val="tx1">
+                    <a:lumMod val="65000"/>
+                    <a:lumOff val="35000"/>
+                  </a:schemeClr>
+                </a:solidFill>
+                <a:ea typeface="Calibri" panose="020F0502020204030204" pitchFamily="34" charset="0"/>
+                <a:cs typeface="Arial" panose="020B0604020202020204" pitchFamily="34" charset="0"/>
+              </a:rPr>
+              <a:t>example</a:t>
+            </a:r>
+            <a:endParaRPr lang="fr-FR" sz="2000" dirty="0">
+              <a:solidFill>
+                <a:schemeClr val="tx1">
+                  <a:lumMod val="65000"/>
+                  <a:lumOff val="35000"/>
+                </a:schemeClr>
+              </a:solidFill>
+              <a:ea typeface="Calibri" panose="020F0502020204030204" pitchFamily="34" charset="0"/>
+              <a:cs typeface="Arial" panose="020B0604020202020204" pitchFamily="34" charset="0"/>
+            </a:endParaRPr>
+          </a:p>
+          <a:p>
+            <a:pPr marL="342900" indent="-342900" algn="just">
+              <a:lnSpc>
+                <a:spcPct val="107000"/>
+              </a:lnSpc>
+              <a:spcAft>
+                <a:spcPts val="800"/>
+              </a:spcAft>
+              <a:buFont typeface="+mj-lt"/>
+              <a:buAutoNum type="arabicPeriod"/>
+            </a:pPr>
+            <a:r>
+              <a:rPr lang="fr-FR" sz="2000" dirty="0">
+                <a:solidFill>
+                  <a:schemeClr val="tx1">
+                    <a:lumMod val="65000"/>
+                    <a:lumOff val="35000"/>
+                  </a:schemeClr>
+                </a:solidFill>
+                <a:ea typeface="Calibri" panose="020F0502020204030204" pitchFamily="34" charset="0"/>
+                <a:cs typeface="Arial" panose="020B0604020202020204" pitchFamily="34" charset="0"/>
+              </a:rPr>
+              <a:t>Coping </a:t>
+            </a:r>
+            <a:r>
+              <a:rPr lang="fr-FR" sz="2000" dirty="0" err="1">
+                <a:solidFill>
+                  <a:schemeClr val="tx1">
+                    <a:lumMod val="65000"/>
+                    <a:lumOff val="35000"/>
+                  </a:schemeClr>
+                </a:solidFill>
+                <a:ea typeface="Calibri" panose="020F0502020204030204" pitchFamily="34" charset="0"/>
+                <a:cs typeface="Arial" panose="020B0604020202020204" pitchFamily="34" charset="0"/>
+              </a:rPr>
+              <a:t>with</a:t>
+            </a:r>
+            <a:r>
+              <a:rPr lang="fr-FR" sz="2000" dirty="0">
+                <a:solidFill>
+                  <a:schemeClr val="tx1">
+                    <a:lumMod val="65000"/>
+                    <a:lumOff val="35000"/>
+                  </a:schemeClr>
+                </a:solidFill>
+                <a:ea typeface="Calibri" panose="020F0502020204030204" pitchFamily="34" charset="0"/>
+                <a:cs typeface="Arial" panose="020B0604020202020204" pitchFamily="34" charset="0"/>
+              </a:rPr>
+              <a:t> the memory issues</a:t>
             </a:r>
           </a:p>
         </p:txBody>
@@ -5165,7 +5266,7 @@
                 <a:ea typeface="Calibri" panose="020F0502020204030204" pitchFamily="34" charset="0"/>
                 <a:cs typeface="Arial" panose="020B0604020202020204" pitchFamily="34" charset="0"/>
               </a:rPr>
-              <a:t>should</a:t>
+              <a:t>may</a:t>
             </a:r>
             <a:r>
               <a:rPr lang="fr-FR" dirty="0">
@@ -6746,6 +6847,32 @@
                 <a:ea typeface="Calibri" panose="020F0502020204030204" pitchFamily="34" charset="0"/>
                 <a:cs typeface="Arial" panose="020B0604020202020204" pitchFamily="34" charset="0"/>
               </a:rPr>
+              <a:t> not trigger </a:t>
+            </a:r>
+            <a:r>
+              <a:rPr lang="fr-FR" dirty="0" err="1">
+                <a:solidFill>
+                  <a:schemeClr val="tx1">
+                    <a:lumMod val="65000"/>
+                    <a:lumOff val="35000"/>
+                  </a:schemeClr>
+                </a:solidFill>
+                <a:ea typeface="Calibri" panose="020F0502020204030204" pitchFamily="34" charset="0"/>
+                <a:cs typeface="Arial" panose="020B0604020202020204" pitchFamily="34" charset="0"/>
+              </a:rPr>
+              <a:t>any</a:t>
+            </a:r>
+            <a:r>
+              <a:rPr lang="fr-FR" dirty="0">
+                <a:solidFill>
+                  <a:schemeClr val="tx1">
+                    <a:lumMod val="65000"/>
+                    <a:lumOff val="35000"/>
+                  </a:schemeClr>
+                </a:solidFill>
+                <a:ea typeface="Calibri" panose="020F0502020204030204" pitchFamily="34" charset="0"/>
+                <a:cs typeface="Arial" panose="020B0604020202020204" pitchFamily="34" charset="0"/>
+              </a:rPr>
               <a:t> </a:t>
             </a:r>
             <a:r>
@@ -6759,33 +6886,7 @@
                 <a:ea typeface="Calibri" panose="020F0502020204030204" pitchFamily="34" charset="0"/>
                 <a:cs typeface="Arial" panose="020B0604020202020204" pitchFamily="34" charset="0"/>
               </a:rPr>
-              <a:t>also</a:t>
-            </a:r>
-            <a:r>
-              <a:rPr lang="fr-FR" dirty="0">
-                <a:solidFill>
-                  <a:schemeClr val="tx1">
-                    <a:lumMod val="65000"/>
-                    <a:lumOff val="35000"/>
-                  </a:schemeClr>
-                </a:solidFill>
-                <a:ea typeface="Calibri" panose="020F0502020204030204" pitchFamily="34" charset="0"/>
-                <a:cs typeface="Arial" panose="020B0604020202020204" pitchFamily="34" charset="0"/>
-              </a:rPr>
-              <a:t> trigger </a:t>
-            </a:r>
-            <a:r>
-              <a:rPr lang="fr-FR" dirty="0" err="1">
-                <a:solidFill>
-                  <a:schemeClr val="tx1">
-                    <a:lumMod val="65000"/>
-                    <a:lumOff val="35000"/>
-                  </a:schemeClr>
-                </a:solidFill>
-                <a:ea typeface="Calibri" panose="020F0502020204030204" pitchFamily="34" charset="0"/>
-                <a:cs typeface="Arial" panose="020B0604020202020204" pitchFamily="34" charset="0"/>
-              </a:rPr>
-              <a:t>any</a:t>
+              <a:t>related</a:t>
             </a:r>
             <a:r>
               <a:rPr lang="fr-FR" dirty="0">
@@ -6811,7 +6912,33 @@
                 <a:ea typeface="Calibri" panose="020F0502020204030204" pitchFamily="34" charset="0"/>
                 <a:cs typeface="Arial" panose="020B0604020202020204" pitchFamily="34" charset="0"/>
               </a:rPr>
-              <a:t>related</a:t>
+              <a:t>event</a:t>
+            </a:r>
+            <a:r>
+              <a:rPr lang="fr-FR" dirty="0">
+                <a:solidFill>
+                  <a:schemeClr val="tx1">
+                    <a:lumMod val="65000"/>
+                    <a:lumOff val="35000"/>
+                  </a:schemeClr>
+                </a:solidFill>
+                <a:ea typeface="Calibri" panose="020F0502020204030204" pitchFamily="34" charset="0"/>
+                <a:cs typeface="Arial" panose="020B0604020202020204" pitchFamily="34" charset="0"/>
+              </a:rPr>
+              <a:t> as </a:t>
+            </a:r>
+            <a:r>
+              <a:rPr lang="fr-FR" dirty="0" err="1">
+                <a:solidFill>
+                  <a:schemeClr val="tx1">
+                    <a:lumMod val="65000"/>
+                    <a:lumOff val="35000"/>
+                  </a:schemeClr>
+                </a:solidFill>
+                <a:ea typeface="Calibri" panose="020F0502020204030204" pitchFamily="34" charset="0"/>
+                <a:cs typeface="Arial" panose="020B0604020202020204" pitchFamily="34" charset="0"/>
+              </a:rPr>
+              <a:t>it</a:t>
             </a:r>
             <a:r>
               <a:rPr lang="fr-FR" dirty="0">
@@ -6837,7 +6964,111 @@
                 <a:ea typeface="Calibri" panose="020F0502020204030204" pitchFamily="34" charset="0"/>
                 <a:cs typeface="Arial" panose="020B0604020202020204" pitchFamily="34" charset="0"/>
               </a:rPr>
-              <a:t>event</a:t>
+              <a:t>would</a:t>
+            </a:r>
+            <a:r>
+              <a:rPr lang="fr-FR" dirty="0">
+                <a:solidFill>
+                  <a:schemeClr val="tx1">
+                    <a:lumMod val="65000"/>
+                    <a:lumOff val="35000"/>
+                  </a:schemeClr>
+                </a:solidFill>
+                <a:ea typeface="Calibri" panose="020F0502020204030204" pitchFamily="34" charset="0"/>
+                <a:cs typeface="Arial" panose="020B0604020202020204" pitchFamily="34" charset="0"/>
+              </a:rPr>
+              <a:t> </a:t>
+            </a:r>
+            <a:r>
+              <a:rPr lang="fr-FR" dirty="0" err="1">
+                <a:solidFill>
+                  <a:schemeClr val="tx1">
+                    <a:lumMod val="65000"/>
+                    <a:lumOff val="35000"/>
+                  </a:schemeClr>
+                </a:solidFill>
+                <a:ea typeface="Calibri" panose="020F0502020204030204" pitchFamily="34" charset="0"/>
+                <a:cs typeface="Arial" panose="020B0604020202020204" pitchFamily="34" charset="0"/>
+              </a:rPr>
+              <a:t>otherwise</a:t>
+            </a:r>
+            <a:r>
+              <a:rPr lang="fr-FR" dirty="0">
+                <a:solidFill>
+                  <a:schemeClr val="tx1">
+                    <a:lumMod val="65000"/>
+                    <a:lumOff val="35000"/>
+                  </a:schemeClr>
+                </a:solidFill>
+                <a:ea typeface="Calibri" panose="020F0502020204030204" pitchFamily="34" charset="0"/>
+                <a:cs typeface="Arial" panose="020B0604020202020204" pitchFamily="34" charset="0"/>
+              </a:rPr>
+              <a:t> </a:t>
+            </a:r>
+            <a:r>
+              <a:rPr lang="fr-FR" dirty="0" err="1">
+                <a:solidFill>
+                  <a:schemeClr val="tx1">
+                    <a:lumMod val="65000"/>
+                    <a:lumOff val="35000"/>
+                  </a:schemeClr>
+                </a:solidFill>
+                <a:ea typeface="Calibri" panose="020F0502020204030204" pitchFamily="34" charset="0"/>
+                <a:cs typeface="Arial" panose="020B0604020202020204" pitchFamily="34" charset="0"/>
+              </a:rPr>
+              <a:t>lessen</a:t>
+            </a:r>
+            <a:r>
+              <a:rPr lang="fr-FR" dirty="0">
+                <a:solidFill>
+                  <a:schemeClr val="tx1">
+                    <a:lumMod val="65000"/>
+                    <a:lumOff val="35000"/>
+                  </a:schemeClr>
+                </a:solidFill>
+                <a:ea typeface="Calibri" panose="020F0502020204030204" pitchFamily="34" charset="0"/>
+                <a:cs typeface="Arial" panose="020B0604020202020204" pitchFamily="34" charset="0"/>
+              </a:rPr>
+              <a:t> the </a:t>
+            </a:r>
+            <a:r>
+              <a:rPr lang="fr-FR" dirty="0" err="1">
+                <a:solidFill>
+                  <a:schemeClr val="tx1">
+                    <a:lumMod val="65000"/>
+                    <a:lumOff val="35000"/>
+                  </a:schemeClr>
+                </a:solidFill>
+                <a:ea typeface="Calibri" panose="020F0502020204030204" pitchFamily="34" charset="0"/>
+                <a:cs typeface="Arial" panose="020B0604020202020204" pitchFamily="34" charset="0"/>
+              </a:rPr>
+              <a:t>reuse</a:t>
+            </a:r>
+            <a:r>
+              <a:rPr lang="fr-FR" dirty="0">
+                <a:solidFill>
+                  <a:schemeClr val="tx1">
+                    <a:lumMod val="65000"/>
+                    <a:lumOff val="35000"/>
+                  </a:schemeClr>
+                </a:solidFill>
+                <a:ea typeface="Calibri" panose="020F0502020204030204" pitchFamily="34" charset="0"/>
+                <a:cs typeface="Arial" panose="020B0604020202020204" pitchFamily="34" charset="0"/>
+              </a:rPr>
+              <a:t> </a:t>
+            </a:r>
+            <a:r>
+              <a:rPr lang="fr-FR" dirty="0" err="1">
+                <a:solidFill>
+                  <a:schemeClr val="tx1">
+                    <a:lumMod val="65000"/>
+                    <a:lumOff val="35000"/>
+                  </a:schemeClr>
+                </a:solidFill>
+                <a:ea typeface="Calibri" panose="020F0502020204030204" pitchFamily="34" charset="0"/>
+                <a:cs typeface="Arial" panose="020B0604020202020204" pitchFamily="34" charset="0"/>
+              </a:rPr>
+              <a:t>possibilities</a:t>
             </a:r>
             <a:r>
               <a:rPr lang="fr-FR" dirty="0">
@@ -9728,6 +9959,939 @@
     <p:extLst>
       <p:ext uri="{BB962C8B-B14F-4D97-AF65-F5344CB8AC3E}">
         <p14:creationId xmlns:p14="http://schemas.microsoft.com/office/powerpoint/2010/main" val="2639746881"/>
+      </p:ext>
+    </p:extLst>
+  </p:cSld>
+  <p:clrMapOvr>
+    <a:masterClrMapping/>
+  </p:clrMapOvr>
+</p:sld>
+</file>
+
+<file path=ppt/slides/slide14.xml><?xml version="1.0" encoding="utf-8"?>
+<p:sld xmlns:a="http://schemas.openxmlformats.org/drawingml/2006/main" xmlns:r="http://schemas.openxmlformats.org/officeDocument/2006/relationships" xmlns:p="http://schemas.openxmlformats.org/presentationml/2006/main">
+  <p:cSld>
+    <p:spTree>
+      <p:nvGrpSpPr>
+        <p:cNvPr id="1" name=""/>
+        <p:cNvGrpSpPr/>
+        <p:nvPr/>
+      </p:nvGrpSpPr>
+      <p:grpSpPr>
+        <a:xfrm>
+          <a:off x="0" y="0"/>
+          <a:ext cx="0" cy="0"/>
+          <a:chOff x="0" y="0"/>
+          <a:chExt cx="0" cy="0"/>
+        </a:xfrm>
+      </p:grpSpPr>
+      <p:sp>
+        <p:nvSpPr>
+          <p:cNvPr id="4" name="Rectangle 3">
+            <a:extLst>
+              <a:ext uri="{FF2B5EF4-FFF2-40B4-BE49-F238E27FC236}">
+                <a16:creationId xmlns:a16="http://schemas.microsoft.com/office/drawing/2014/main" id="{ECD7FB32-7D44-4892-B673-0D6C3A402A20}"/>
+              </a:ext>
+            </a:extLst>
+          </p:cNvPr>
+          <p:cNvSpPr/>
+          <p:nvPr/>
+        </p:nvSpPr>
+        <p:spPr>
+          <a:xfrm>
+            <a:off x="1895831" y="312808"/>
+            <a:ext cx="5431295" cy="626518"/>
+          </a:xfrm>
+          <a:prstGeom prst="rect">
+            <a:avLst/>
+          </a:prstGeom>
+        </p:spPr>
+        <p:txBody>
+          <a:bodyPr wrap="none">
+            <a:spAutoFit/>
+          </a:bodyPr>
+          <a:lstStyle/>
+          <a:p>
+            <a:pPr>
+              <a:lnSpc>
+                <a:spcPct val="120000"/>
+              </a:lnSpc>
+              <a:spcAft>
+                <a:spcPts val="0"/>
+              </a:spcAft>
+            </a:pPr>
+            <a:r>
+              <a:rPr lang="en-US" sz="3200" dirty="0" err="1">
+                <a:solidFill>
+                  <a:schemeClr val="tx1">
+                    <a:lumMod val="75000"/>
+                    <a:lumOff val="25000"/>
+                  </a:schemeClr>
+                </a:solidFill>
+                <a:latin typeface="Century Gothic" panose="020B0502020202020204" pitchFamily="34" charset="0"/>
+                <a:ea typeface="MS Mincho" panose="02020609040205080304" pitchFamily="49" charset="-128"/>
+                <a:cs typeface="MinionPro-Regular"/>
+              </a:rPr>
+              <a:t>Pikcio</a:t>
+            </a:r>
+            <a:r>
+              <a:rPr lang="en-US" sz="3200" dirty="0">
+                <a:solidFill>
+                  <a:schemeClr val="tx1">
+                    <a:lumMod val="75000"/>
+                    <a:lumOff val="25000"/>
+                  </a:schemeClr>
+                </a:solidFill>
+                <a:latin typeface="Century Gothic" panose="020B0502020202020204" pitchFamily="34" charset="0"/>
+                <a:ea typeface="MS Mincho" panose="02020609040205080304" pitchFamily="49" charset="-128"/>
+                <a:cs typeface="MinionPro-Regular"/>
+              </a:rPr>
+              <a:t> Token: Storage issue</a:t>
+            </a:r>
+            <a:endParaRPr lang="fr-FR" sz="1200" dirty="0">
+              <a:solidFill>
+                <a:schemeClr val="tx1">
+                  <a:lumMod val="75000"/>
+                  <a:lumOff val="25000"/>
+                </a:schemeClr>
+              </a:solidFill>
+              <a:latin typeface="Century Gothic" panose="020B0502020202020204" pitchFamily="34" charset="0"/>
+              <a:ea typeface="MS Mincho" panose="02020609040205080304" pitchFamily="49" charset="-128"/>
+              <a:cs typeface="MinionPro-Regular"/>
+            </a:endParaRPr>
+          </a:p>
+        </p:txBody>
+      </p:sp>
+      <p:sp>
+        <p:nvSpPr>
+          <p:cNvPr id="15" name="ZoneTexte 14">
+            <a:extLst>
+              <a:ext uri="{FF2B5EF4-FFF2-40B4-BE49-F238E27FC236}">
+                <a16:creationId xmlns:a16="http://schemas.microsoft.com/office/drawing/2014/main" id="{774FD80A-0D76-4ADD-BA49-1351202F3655}"/>
+              </a:ext>
+            </a:extLst>
+          </p:cNvPr>
+          <p:cNvSpPr txBox="1"/>
+          <p:nvPr/>
+        </p:nvSpPr>
+        <p:spPr>
+          <a:xfrm>
+            <a:off x="9889491" y="6581001"/>
+            <a:ext cx="2299732" cy="276999"/>
+          </a:xfrm>
+          <a:prstGeom prst="rect">
+            <a:avLst/>
+          </a:prstGeom>
+          <a:noFill/>
+        </p:spPr>
+        <p:txBody>
+          <a:bodyPr wrap="none" rtlCol="0">
+            <a:spAutoFit/>
+          </a:bodyPr>
+          <a:lstStyle/>
+          <a:p>
+            <a:r>
+              <a:rPr lang="fr-FR" sz="1200" dirty="0">
+                <a:solidFill>
+                  <a:schemeClr val="tx1">
+                    <a:lumMod val="50000"/>
+                    <a:lumOff val="50000"/>
+                  </a:schemeClr>
+                </a:solidFill>
+                <a:latin typeface="Arial" panose="020B0604020202020204" pitchFamily="34" charset="0"/>
+                <a:cs typeface="Arial" panose="020B0604020202020204" pitchFamily="34" charset="0"/>
+              </a:rPr>
+              <a:t>PIKCIO CONFIDENTIAL 2018 </a:t>
+            </a:r>
+          </a:p>
+        </p:txBody>
+      </p:sp>
+      <p:pic>
+        <p:nvPicPr>
+          <p:cNvPr id="16" name="Image 15">
+            <a:extLst>
+              <a:ext uri="{FF2B5EF4-FFF2-40B4-BE49-F238E27FC236}">
+                <a16:creationId xmlns:a16="http://schemas.microsoft.com/office/drawing/2014/main" id="{37DDC0F3-7858-4A5A-95F0-03B494B0AB8F}"/>
+              </a:ext>
+            </a:extLst>
+          </p:cNvPr>
+          <p:cNvPicPr>
+            <a:picLocks noChangeAspect="1"/>
+          </p:cNvPicPr>
+          <p:nvPr/>
+        </p:nvPicPr>
+        <p:blipFill>
+          <a:blip r:embed="rId2"/>
+          <a:stretch>
+            <a:fillRect/>
+          </a:stretch>
+        </p:blipFill>
+        <p:spPr>
+          <a:xfrm>
+            <a:off x="11454" y="0"/>
+            <a:ext cx="1555426" cy="1154977"/>
+          </a:xfrm>
+          <a:prstGeom prst="rect">
+            <a:avLst/>
+          </a:prstGeom>
+        </p:spPr>
+      </p:pic>
+      <p:sp>
+        <p:nvSpPr>
+          <p:cNvPr id="7" name="Zone de texte 2">
+            <a:extLst>
+              <a:ext uri="{FF2B5EF4-FFF2-40B4-BE49-F238E27FC236}">
+                <a16:creationId xmlns:a16="http://schemas.microsoft.com/office/drawing/2014/main" id="{AF8D6609-FFCF-BC45-A2F1-EB0790AF01F5}"/>
+              </a:ext>
+            </a:extLst>
+          </p:cNvPr>
+          <p:cNvSpPr txBox="1">
+            <a:spLocks noChangeArrowheads="1"/>
+          </p:cNvSpPr>
+          <p:nvPr/>
+        </p:nvSpPr>
+        <p:spPr bwMode="auto">
+          <a:xfrm>
+            <a:off x="1031844" y="1363424"/>
+            <a:ext cx="10698601" cy="4558877"/>
+          </a:xfrm>
+          <a:prstGeom prst="rect">
+            <a:avLst/>
+          </a:prstGeom>
+          <a:noFill/>
+          <a:ln w="9525">
+            <a:noFill/>
+            <a:miter lim="800000"/>
+            <a:headEnd/>
+            <a:tailEnd/>
+          </a:ln>
+        </p:spPr>
+        <p:txBody>
+          <a:bodyPr rot="0" vert="horz" wrap="square" lIns="91440" tIns="45720" rIns="91440" bIns="45720" anchor="t" anchorCtr="0">
+            <a:spAutoFit/>
+          </a:bodyPr>
+          <a:lstStyle/>
+          <a:p>
+            <a:pPr lvl="0" algn="just">
+              <a:lnSpc>
+                <a:spcPct val="107000"/>
+              </a:lnSpc>
+              <a:spcAft>
+                <a:spcPts val="800"/>
+              </a:spcAft>
+            </a:pPr>
+            <a:r>
+              <a:rPr lang="en-GB" b="1" dirty="0">
+                <a:solidFill>
+                  <a:schemeClr val="tx1">
+                    <a:lumMod val="65000"/>
+                    <a:lumOff val="35000"/>
+                  </a:schemeClr>
+                </a:solidFill>
+                <a:ea typeface="Calibri" panose="020F0502020204030204" pitchFamily="34" charset="0"/>
+                <a:cs typeface="Arial" panose="020B0604020202020204" pitchFamily="34" charset="0"/>
+              </a:rPr>
+              <a:t>Balance and allowances can potentially become huge</a:t>
+            </a:r>
+          </a:p>
+          <a:p>
+            <a:pPr lvl="0" algn="just">
+              <a:lnSpc>
+                <a:spcPct val="107000"/>
+              </a:lnSpc>
+              <a:spcAft>
+                <a:spcPts val="800"/>
+              </a:spcAft>
+            </a:pPr>
+            <a:r>
+              <a:rPr lang="en-GB" dirty="0">
+                <a:solidFill>
+                  <a:schemeClr val="tx1">
+                    <a:lumMod val="65000"/>
+                    <a:lumOff val="35000"/>
+                  </a:schemeClr>
+                </a:solidFill>
+                <a:ea typeface="Calibri" panose="020F0502020204030204" pitchFamily="34" charset="0"/>
+                <a:cs typeface="Arial" panose="020B0604020202020204" pitchFamily="34" charset="0"/>
+              </a:rPr>
+              <a:t>If the token has hundreds of thousands users, those two maps (plus possibly other storage variables) may become a burden to store. Let’s assume (roughly):</a:t>
+            </a:r>
+          </a:p>
+          <a:p>
+            <a:pPr marL="285750" lvl="0" indent="-285750" algn="just">
+              <a:lnSpc>
+                <a:spcPct val="107000"/>
+              </a:lnSpc>
+              <a:spcAft>
+                <a:spcPts val="800"/>
+              </a:spcAft>
+              <a:buFont typeface="Arial" panose="020B0604020202020204" pitchFamily="34" charset="0"/>
+              <a:buChar char="•"/>
+            </a:pPr>
+            <a:r>
+              <a:rPr lang="en-GB" dirty="0">
+                <a:solidFill>
+                  <a:schemeClr val="tx1">
+                    <a:lumMod val="65000"/>
+                    <a:lumOff val="35000"/>
+                  </a:schemeClr>
+                </a:solidFill>
+                <a:ea typeface="Calibri" panose="020F0502020204030204" pitchFamily="34" charset="0"/>
+                <a:cs typeface="Arial" panose="020B0604020202020204" pitchFamily="34" charset="0"/>
+              </a:rPr>
+              <a:t>A balance entry stored as JSON is </a:t>
+            </a:r>
+            <a:r>
+              <a:rPr lang="fr-FR" dirty="0">
+                <a:solidFill>
+                  <a:schemeClr val="tx1">
+                    <a:lumMod val="65000"/>
+                    <a:lumOff val="35000"/>
+                  </a:schemeClr>
+                </a:solidFill>
+                <a:ea typeface="Calibri" panose="020F0502020204030204" pitchFamily="34" charset="0"/>
+                <a:cs typeface="Arial" panose="020B0604020202020204" pitchFamily="34" charset="0"/>
+              </a:rPr>
+              <a:t>~</a:t>
+            </a:r>
+            <a:r>
+              <a:rPr lang="en-GB" dirty="0">
+                <a:solidFill>
+                  <a:schemeClr val="tx1">
+                    <a:lumMod val="65000"/>
+                    <a:lumOff val="35000"/>
+                  </a:schemeClr>
+                </a:solidFill>
+                <a:ea typeface="Calibri" panose="020F0502020204030204" pitchFamily="34" charset="0"/>
+                <a:cs typeface="Arial" panose="020B0604020202020204" pitchFamily="34" charset="0"/>
+              </a:rPr>
+              <a:t>70 digits long: 64 for the address, 5 for the amount plus a separator.</a:t>
+            </a:r>
+          </a:p>
+          <a:p>
+            <a:pPr marL="285750" lvl="0" indent="-285750" algn="just">
+              <a:lnSpc>
+                <a:spcPct val="107000"/>
+              </a:lnSpc>
+              <a:spcAft>
+                <a:spcPts val="800"/>
+              </a:spcAft>
+              <a:buFont typeface="Arial" panose="020B0604020202020204" pitchFamily="34" charset="0"/>
+              <a:buChar char="•"/>
+            </a:pPr>
+            <a:r>
+              <a:rPr lang="en-GB" dirty="0">
+                <a:solidFill>
+                  <a:schemeClr val="tx1">
+                    <a:lumMod val="65000"/>
+                    <a:lumOff val="35000"/>
+                  </a:schemeClr>
+                </a:solidFill>
+                <a:ea typeface="Calibri" panose="020F0502020204030204" pitchFamily="34" charset="0"/>
+                <a:cs typeface="Arial" panose="020B0604020202020204" pitchFamily="34" charset="0"/>
+              </a:rPr>
+              <a:t>The balance has 100,000 entries.</a:t>
+            </a:r>
+          </a:p>
+          <a:p>
+            <a:pPr marL="285750" lvl="0" indent="-285750" algn="just">
+              <a:lnSpc>
+                <a:spcPct val="107000"/>
+              </a:lnSpc>
+              <a:spcAft>
+                <a:spcPts val="800"/>
+              </a:spcAft>
+              <a:buFont typeface="Arial" panose="020B0604020202020204" pitchFamily="34" charset="0"/>
+              <a:buChar char="•"/>
+            </a:pPr>
+            <a:r>
+              <a:rPr lang="en-GB" dirty="0">
+                <a:solidFill>
+                  <a:schemeClr val="tx1">
+                    <a:lumMod val="65000"/>
+                    <a:lumOff val="35000"/>
+                  </a:schemeClr>
+                </a:solidFill>
+                <a:ea typeface="Calibri" panose="020F0502020204030204" pitchFamily="34" charset="0"/>
+                <a:cs typeface="Arial" panose="020B0604020202020204" pitchFamily="34" charset="0"/>
+              </a:rPr>
+              <a:t>100,000 x 70 = 7,000,000 bytes = 6.67 Mb</a:t>
+            </a:r>
+          </a:p>
+          <a:p>
+            <a:pPr lvl="0" algn="just">
+              <a:lnSpc>
+                <a:spcPct val="107000"/>
+              </a:lnSpc>
+              <a:spcAft>
+                <a:spcPts val="800"/>
+              </a:spcAft>
+            </a:pPr>
+            <a:r>
+              <a:rPr lang="en-GB" dirty="0">
+                <a:solidFill>
+                  <a:schemeClr val="tx1">
+                    <a:lumMod val="65000"/>
+                    <a:lumOff val="35000"/>
+                  </a:schemeClr>
+                </a:solidFill>
+                <a:ea typeface="Calibri" panose="020F0502020204030204" pitchFamily="34" charset="0"/>
+                <a:cs typeface="Arial" panose="020B0604020202020204" pitchFamily="34" charset="0"/>
+              </a:rPr>
+              <a:t>If balance is mentioned in the JSON in the “before” and “after” sections of the call, it makes it a payload of 13Mb per call to store in the ledger.</a:t>
+            </a:r>
+          </a:p>
+          <a:p>
+            <a:pPr lvl="0" algn="just">
+              <a:lnSpc>
+                <a:spcPct val="107000"/>
+              </a:lnSpc>
+              <a:spcAft>
+                <a:spcPts val="800"/>
+              </a:spcAft>
+            </a:pPr>
+            <a:endParaRPr lang="en-GB" dirty="0">
+              <a:solidFill>
+                <a:schemeClr val="tx1">
+                  <a:lumMod val="65000"/>
+                  <a:lumOff val="35000"/>
+                </a:schemeClr>
+              </a:solidFill>
+              <a:ea typeface="Calibri" panose="020F0502020204030204" pitchFamily="34" charset="0"/>
+              <a:cs typeface="Arial" panose="020B0604020202020204" pitchFamily="34" charset="0"/>
+            </a:endParaRPr>
+          </a:p>
+          <a:p>
+            <a:pPr lvl="0" algn="just">
+              <a:lnSpc>
+                <a:spcPct val="107000"/>
+              </a:lnSpc>
+              <a:spcAft>
+                <a:spcPts val="800"/>
+              </a:spcAft>
+            </a:pPr>
+            <a:r>
+              <a:rPr lang="en-GB" dirty="0">
+                <a:solidFill>
+                  <a:schemeClr val="tx1">
+                    <a:lumMod val="65000"/>
+                    <a:lumOff val="35000"/>
+                  </a:schemeClr>
+                </a:solidFill>
+                <a:ea typeface="Calibri" panose="020F0502020204030204" pitchFamily="34" charset="0"/>
+                <a:cs typeface="Arial" panose="020B0604020202020204" pitchFamily="34" charset="0"/>
+              </a:rPr>
+              <a:t>This statement applies:</a:t>
+            </a:r>
+          </a:p>
+          <a:p>
+            <a:pPr marL="285750" lvl="0" indent="-285750" algn="just">
+              <a:lnSpc>
+                <a:spcPct val="107000"/>
+              </a:lnSpc>
+              <a:spcAft>
+                <a:spcPts val="800"/>
+              </a:spcAft>
+              <a:buFont typeface="Arial" panose="020B0604020202020204" pitchFamily="34" charset="0"/>
+              <a:buChar char="•"/>
+            </a:pPr>
+            <a:r>
+              <a:rPr lang="en-GB" dirty="0">
+                <a:solidFill>
+                  <a:schemeClr val="tx1">
+                    <a:lumMod val="65000"/>
+                    <a:lumOff val="35000"/>
+                  </a:schemeClr>
+                </a:solidFill>
+                <a:ea typeface="Calibri" panose="020F0502020204030204" pitchFamily="34" charset="0"/>
+                <a:cs typeface="Arial" panose="020B0604020202020204" pitchFamily="34" charset="0"/>
+              </a:rPr>
+              <a:t>to all types of variable which length is not fixed (</a:t>
+            </a:r>
+            <a:r>
+              <a:rPr lang="en-GB" dirty="0" err="1">
+                <a:solidFill>
+                  <a:schemeClr val="tx1">
+                    <a:lumMod val="65000"/>
+                    <a:lumOff val="35000"/>
+                  </a:schemeClr>
+                </a:solidFill>
+                <a:ea typeface="Calibri" panose="020F0502020204030204" pitchFamily="34" charset="0"/>
+                <a:cs typeface="Arial" panose="020B0604020202020204" pitchFamily="34" charset="0"/>
+              </a:rPr>
+              <a:t>str</a:t>
+            </a:r>
+            <a:r>
+              <a:rPr lang="en-GB" dirty="0">
+                <a:solidFill>
+                  <a:schemeClr val="tx1">
+                    <a:lumMod val="65000"/>
+                    <a:lumOff val="35000"/>
+                  </a:schemeClr>
+                </a:solidFill>
+                <a:ea typeface="Calibri" panose="020F0502020204030204" pitchFamily="34" charset="0"/>
+                <a:cs typeface="Arial" panose="020B0604020202020204" pitchFamily="34" charset="0"/>
+              </a:rPr>
+              <a:t>, map, list, set, tuple, bytes)</a:t>
+            </a:r>
+          </a:p>
+          <a:p>
+            <a:pPr marL="285750" lvl="0" indent="-285750" algn="just">
+              <a:lnSpc>
+                <a:spcPct val="107000"/>
+              </a:lnSpc>
+              <a:spcAft>
+                <a:spcPts val="800"/>
+              </a:spcAft>
+              <a:buFont typeface="Arial" panose="020B0604020202020204" pitchFamily="34" charset="0"/>
+              <a:buChar char="•"/>
+            </a:pPr>
+            <a:r>
+              <a:rPr lang="en-GB" dirty="0">
+                <a:solidFill>
+                  <a:schemeClr val="tx1">
+                    <a:lumMod val="65000"/>
+                    <a:lumOff val="35000"/>
+                  </a:schemeClr>
+                </a:solidFill>
+                <a:ea typeface="Calibri" panose="020F0502020204030204" pitchFamily="34" charset="0"/>
+                <a:cs typeface="Arial" panose="020B0604020202020204" pitchFamily="34" charset="0"/>
+              </a:rPr>
+              <a:t>To all kinds of smart contracts</a:t>
+            </a:r>
+          </a:p>
+        </p:txBody>
+      </p:sp>
+    </p:spTree>
+    <p:extLst>
+      <p:ext uri="{BB962C8B-B14F-4D97-AF65-F5344CB8AC3E}">
+        <p14:creationId xmlns:p14="http://schemas.microsoft.com/office/powerpoint/2010/main" val="2500925259"/>
+      </p:ext>
+    </p:extLst>
+  </p:cSld>
+  <p:clrMapOvr>
+    <a:masterClrMapping/>
+  </p:clrMapOvr>
+</p:sld>
+</file>
+
+<file path=ppt/slides/slide15.xml><?xml version="1.0" encoding="utf-8"?>
+<p:sld xmlns:a="http://schemas.openxmlformats.org/drawingml/2006/main" xmlns:r="http://schemas.openxmlformats.org/officeDocument/2006/relationships" xmlns:p="http://schemas.openxmlformats.org/presentationml/2006/main">
+  <p:cSld>
+    <p:spTree>
+      <p:nvGrpSpPr>
+        <p:cNvPr id="1" name=""/>
+        <p:cNvGrpSpPr/>
+        <p:nvPr/>
+      </p:nvGrpSpPr>
+      <p:grpSpPr>
+        <a:xfrm>
+          <a:off x="0" y="0"/>
+          <a:ext cx="0" cy="0"/>
+          <a:chOff x="0" y="0"/>
+          <a:chExt cx="0" cy="0"/>
+        </a:xfrm>
+      </p:grpSpPr>
+      <p:sp>
+        <p:nvSpPr>
+          <p:cNvPr id="4" name="Rectangle 3">
+            <a:extLst>
+              <a:ext uri="{FF2B5EF4-FFF2-40B4-BE49-F238E27FC236}">
+                <a16:creationId xmlns:a16="http://schemas.microsoft.com/office/drawing/2014/main" id="{ECD7FB32-7D44-4892-B673-0D6C3A402A20}"/>
+              </a:ext>
+            </a:extLst>
+          </p:cNvPr>
+          <p:cNvSpPr/>
+          <p:nvPr/>
+        </p:nvSpPr>
+        <p:spPr>
+          <a:xfrm>
+            <a:off x="1895831" y="312808"/>
+            <a:ext cx="6016391" cy="626518"/>
+          </a:xfrm>
+          <a:prstGeom prst="rect">
+            <a:avLst/>
+          </a:prstGeom>
+        </p:spPr>
+        <p:txBody>
+          <a:bodyPr wrap="none">
+            <a:spAutoFit/>
+          </a:bodyPr>
+          <a:lstStyle/>
+          <a:p>
+            <a:pPr>
+              <a:lnSpc>
+                <a:spcPct val="120000"/>
+              </a:lnSpc>
+              <a:spcAft>
+                <a:spcPts val="0"/>
+              </a:spcAft>
+            </a:pPr>
+            <a:r>
+              <a:rPr lang="en-US" sz="3200" dirty="0" err="1">
+                <a:solidFill>
+                  <a:schemeClr val="tx1">
+                    <a:lumMod val="75000"/>
+                    <a:lumOff val="25000"/>
+                  </a:schemeClr>
+                </a:solidFill>
+                <a:latin typeface="Century Gothic" panose="020B0502020202020204" pitchFamily="34" charset="0"/>
+                <a:ea typeface="MS Mincho" panose="02020609040205080304" pitchFamily="49" charset="-128"/>
+                <a:cs typeface="MinionPro-Regular"/>
+              </a:rPr>
+              <a:t>Pikcio</a:t>
+            </a:r>
+            <a:r>
+              <a:rPr lang="en-US" sz="3200" dirty="0">
+                <a:solidFill>
+                  <a:schemeClr val="tx1">
+                    <a:lumMod val="75000"/>
+                    <a:lumOff val="25000"/>
+                  </a:schemeClr>
+                </a:solidFill>
+                <a:latin typeface="Century Gothic" panose="020B0502020202020204" pitchFamily="34" charset="0"/>
+                <a:ea typeface="MS Mincho" panose="02020609040205080304" pitchFamily="49" charset="-128"/>
+                <a:cs typeface="MinionPro-Regular"/>
+              </a:rPr>
+              <a:t> Token: Storage solution</a:t>
+            </a:r>
+            <a:endParaRPr lang="fr-FR" sz="1200" dirty="0">
+              <a:solidFill>
+                <a:schemeClr val="tx1">
+                  <a:lumMod val="75000"/>
+                  <a:lumOff val="25000"/>
+                </a:schemeClr>
+              </a:solidFill>
+              <a:latin typeface="Century Gothic" panose="020B0502020202020204" pitchFamily="34" charset="0"/>
+              <a:ea typeface="MS Mincho" panose="02020609040205080304" pitchFamily="49" charset="-128"/>
+              <a:cs typeface="MinionPro-Regular"/>
+            </a:endParaRPr>
+          </a:p>
+        </p:txBody>
+      </p:sp>
+      <p:sp>
+        <p:nvSpPr>
+          <p:cNvPr id="15" name="ZoneTexte 14">
+            <a:extLst>
+              <a:ext uri="{FF2B5EF4-FFF2-40B4-BE49-F238E27FC236}">
+                <a16:creationId xmlns:a16="http://schemas.microsoft.com/office/drawing/2014/main" id="{774FD80A-0D76-4ADD-BA49-1351202F3655}"/>
+              </a:ext>
+            </a:extLst>
+          </p:cNvPr>
+          <p:cNvSpPr txBox="1"/>
+          <p:nvPr/>
+        </p:nvSpPr>
+        <p:spPr>
+          <a:xfrm>
+            <a:off x="9889491" y="6581001"/>
+            <a:ext cx="2299732" cy="276999"/>
+          </a:xfrm>
+          <a:prstGeom prst="rect">
+            <a:avLst/>
+          </a:prstGeom>
+          <a:noFill/>
+        </p:spPr>
+        <p:txBody>
+          <a:bodyPr wrap="none" rtlCol="0">
+            <a:spAutoFit/>
+          </a:bodyPr>
+          <a:lstStyle/>
+          <a:p>
+            <a:r>
+              <a:rPr lang="fr-FR" sz="1200" dirty="0">
+                <a:solidFill>
+                  <a:schemeClr val="tx1">
+                    <a:lumMod val="50000"/>
+                    <a:lumOff val="50000"/>
+                  </a:schemeClr>
+                </a:solidFill>
+                <a:latin typeface="Arial" panose="020B0604020202020204" pitchFamily="34" charset="0"/>
+                <a:cs typeface="Arial" panose="020B0604020202020204" pitchFamily="34" charset="0"/>
+              </a:rPr>
+              <a:t>PIKCIO CONFIDENTIAL 2018 </a:t>
+            </a:r>
+          </a:p>
+        </p:txBody>
+      </p:sp>
+      <p:pic>
+        <p:nvPicPr>
+          <p:cNvPr id="16" name="Image 15">
+            <a:extLst>
+              <a:ext uri="{FF2B5EF4-FFF2-40B4-BE49-F238E27FC236}">
+                <a16:creationId xmlns:a16="http://schemas.microsoft.com/office/drawing/2014/main" id="{37DDC0F3-7858-4A5A-95F0-03B494B0AB8F}"/>
+              </a:ext>
+            </a:extLst>
+          </p:cNvPr>
+          <p:cNvPicPr>
+            <a:picLocks noChangeAspect="1"/>
+          </p:cNvPicPr>
+          <p:nvPr/>
+        </p:nvPicPr>
+        <p:blipFill>
+          <a:blip r:embed="rId2"/>
+          <a:stretch>
+            <a:fillRect/>
+          </a:stretch>
+        </p:blipFill>
+        <p:spPr>
+          <a:xfrm>
+            <a:off x="11454" y="0"/>
+            <a:ext cx="1555426" cy="1154977"/>
+          </a:xfrm>
+          <a:prstGeom prst="rect">
+            <a:avLst/>
+          </a:prstGeom>
+        </p:spPr>
+      </p:pic>
+      <p:sp>
+        <p:nvSpPr>
+          <p:cNvPr id="7" name="Zone de texte 2">
+            <a:extLst>
+              <a:ext uri="{FF2B5EF4-FFF2-40B4-BE49-F238E27FC236}">
+                <a16:creationId xmlns:a16="http://schemas.microsoft.com/office/drawing/2014/main" id="{AF8D6609-FFCF-BC45-A2F1-EB0790AF01F5}"/>
+              </a:ext>
+            </a:extLst>
+          </p:cNvPr>
+          <p:cNvSpPr txBox="1">
+            <a:spLocks noChangeArrowheads="1"/>
+          </p:cNvSpPr>
+          <p:nvPr/>
+        </p:nvSpPr>
+        <p:spPr bwMode="auto">
+          <a:xfrm>
+            <a:off x="1031844" y="1363424"/>
+            <a:ext cx="10698601" cy="3168240"/>
+          </a:xfrm>
+          <a:prstGeom prst="rect">
+            <a:avLst/>
+          </a:prstGeom>
+          <a:noFill/>
+          <a:ln w="9525">
+            <a:noFill/>
+            <a:miter lim="800000"/>
+            <a:headEnd/>
+            <a:tailEnd/>
+          </a:ln>
+        </p:spPr>
+        <p:txBody>
+          <a:bodyPr rot="0" vert="horz" wrap="square" lIns="91440" tIns="45720" rIns="91440" bIns="45720" anchor="t" anchorCtr="0">
+            <a:spAutoFit/>
+          </a:bodyPr>
+          <a:lstStyle/>
+          <a:p>
+            <a:pPr lvl="0" algn="just">
+              <a:lnSpc>
+                <a:spcPct val="107000"/>
+              </a:lnSpc>
+              <a:spcAft>
+                <a:spcPts val="800"/>
+              </a:spcAft>
+            </a:pPr>
+            <a:r>
+              <a:rPr lang="en-GB" b="1" dirty="0">
+                <a:solidFill>
+                  <a:schemeClr val="tx1">
+                    <a:lumMod val="65000"/>
+                    <a:lumOff val="35000"/>
+                  </a:schemeClr>
+                </a:solidFill>
+                <a:ea typeface="Calibri" panose="020F0502020204030204" pitchFamily="34" charset="0"/>
+                <a:cs typeface="Arial" panose="020B0604020202020204" pitchFamily="34" charset="0"/>
+              </a:rPr>
+              <a:t>The ledger should not save consecutive states of a variable but only the delta of each call</a:t>
+            </a:r>
+          </a:p>
+          <a:p>
+            <a:pPr lvl="0" algn="just">
+              <a:lnSpc>
+                <a:spcPct val="107000"/>
+              </a:lnSpc>
+              <a:spcAft>
+                <a:spcPts val="800"/>
+              </a:spcAft>
+            </a:pPr>
+            <a:r>
+              <a:rPr lang="en-GB" dirty="0">
+                <a:solidFill>
+                  <a:schemeClr val="tx1">
+                    <a:lumMod val="65000"/>
+                    <a:lumOff val="35000"/>
+                  </a:schemeClr>
+                </a:solidFill>
+                <a:ea typeface="Calibri" panose="020F0502020204030204" pitchFamily="34" charset="0"/>
+                <a:cs typeface="Arial" panose="020B0604020202020204" pitchFamily="34" charset="0"/>
+              </a:rPr>
+              <a:t>This is the standard approach used by source control tools like git or SVN:</a:t>
+            </a:r>
+          </a:p>
+          <a:p>
+            <a:pPr marL="285750" lvl="0" indent="-285750" algn="just">
+              <a:lnSpc>
+                <a:spcPct val="107000"/>
+              </a:lnSpc>
+              <a:spcAft>
+                <a:spcPts val="800"/>
+              </a:spcAft>
+              <a:buFont typeface="Arial" panose="020B0604020202020204" pitchFamily="34" charset="0"/>
+              <a:buChar char="•"/>
+            </a:pPr>
+            <a:r>
+              <a:rPr lang="en-GB" dirty="0">
+                <a:solidFill>
+                  <a:schemeClr val="tx1">
+                    <a:lumMod val="65000"/>
+                    <a:lumOff val="35000"/>
+                  </a:schemeClr>
+                </a:solidFill>
+                <a:ea typeface="Calibri" panose="020F0502020204030204" pitchFamily="34" charset="0"/>
+                <a:cs typeface="Arial" panose="020B0604020202020204" pitchFamily="34" charset="0"/>
+              </a:rPr>
+              <a:t>Each node (execution details stored in the ledger) contains only the difference with the previous node</a:t>
+            </a:r>
+          </a:p>
+          <a:p>
+            <a:pPr marL="285750" lvl="0" indent="-285750" algn="just">
+              <a:lnSpc>
+                <a:spcPct val="107000"/>
+              </a:lnSpc>
+              <a:spcAft>
+                <a:spcPts val="800"/>
+              </a:spcAft>
+              <a:buFont typeface="Arial" panose="020B0604020202020204" pitchFamily="34" charset="0"/>
+              <a:buChar char="•"/>
+            </a:pPr>
+            <a:r>
+              <a:rPr lang="en-GB" dirty="0">
+                <a:solidFill>
+                  <a:schemeClr val="tx1">
+                    <a:lumMod val="65000"/>
+                    <a:lumOff val="35000"/>
+                  </a:schemeClr>
+                </a:solidFill>
+                <a:ea typeface="Calibri" panose="020F0502020204030204" pitchFamily="34" charset="0"/>
+                <a:cs typeface="Arial" panose="020B0604020202020204" pitchFamily="34" charset="0"/>
+              </a:rPr>
+              <a:t>It is possible to rebuild the current state by applying in order all the deltas </a:t>
+            </a:r>
+          </a:p>
+          <a:p>
+            <a:pPr lvl="0" algn="just">
+              <a:lnSpc>
+                <a:spcPct val="107000"/>
+              </a:lnSpc>
+              <a:spcAft>
+                <a:spcPts val="800"/>
+              </a:spcAft>
+            </a:pPr>
+            <a:endParaRPr lang="en-GB" dirty="0">
+              <a:solidFill>
+                <a:schemeClr val="tx1">
+                  <a:lumMod val="65000"/>
+                  <a:lumOff val="35000"/>
+                </a:schemeClr>
+              </a:solidFill>
+              <a:ea typeface="Calibri" panose="020F0502020204030204" pitchFamily="34" charset="0"/>
+              <a:cs typeface="Arial" panose="020B0604020202020204" pitchFamily="34" charset="0"/>
+            </a:endParaRPr>
+          </a:p>
+          <a:p>
+            <a:pPr lvl="0" algn="just">
+              <a:lnSpc>
+                <a:spcPct val="107000"/>
+              </a:lnSpc>
+              <a:spcAft>
+                <a:spcPts val="800"/>
+              </a:spcAft>
+            </a:pPr>
+            <a:endParaRPr lang="en-GB" dirty="0">
+              <a:solidFill>
+                <a:schemeClr val="tx1">
+                  <a:lumMod val="65000"/>
+                  <a:lumOff val="35000"/>
+                </a:schemeClr>
+              </a:solidFill>
+              <a:ea typeface="Calibri" panose="020F0502020204030204" pitchFamily="34" charset="0"/>
+              <a:cs typeface="Arial" panose="020B0604020202020204" pitchFamily="34" charset="0"/>
+            </a:endParaRPr>
+          </a:p>
+          <a:p>
+            <a:pPr lvl="0" algn="just">
+              <a:lnSpc>
+                <a:spcPct val="107000"/>
+              </a:lnSpc>
+              <a:spcAft>
+                <a:spcPts val="800"/>
+              </a:spcAft>
+            </a:pPr>
+            <a:r>
+              <a:rPr lang="en-GB" b="1" dirty="0">
+                <a:solidFill>
+                  <a:schemeClr val="tx1">
+                    <a:lumMod val="65000"/>
+                    <a:lumOff val="35000"/>
+                  </a:schemeClr>
+                </a:solidFill>
+                <a:ea typeface="Calibri" panose="020F0502020204030204" pitchFamily="34" charset="0"/>
+                <a:cs typeface="Arial" panose="020B0604020202020204" pitchFamily="34" charset="0"/>
+              </a:rPr>
+              <a:t>The </a:t>
+            </a:r>
+            <a:r>
+              <a:rPr lang="en-GB" b="1" dirty="0" err="1">
+                <a:solidFill>
+                  <a:schemeClr val="tx1">
+                    <a:lumMod val="65000"/>
+                    <a:lumOff val="35000"/>
+                  </a:schemeClr>
+                </a:solidFill>
+                <a:ea typeface="Calibri" panose="020F0502020204030204" pitchFamily="34" charset="0"/>
+                <a:cs typeface="Arial" panose="020B0604020202020204" pitchFamily="34" charset="0"/>
+              </a:rPr>
+              <a:t>masternodes</a:t>
+            </a:r>
+            <a:r>
+              <a:rPr lang="en-GB" b="1" dirty="0">
+                <a:solidFill>
+                  <a:schemeClr val="tx1">
+                    <a:lumMod val="65000"/>
+                    <a:lumOff val="35000"/>
+                  </a:schemeClr>
+                </a:solidFill>
+                <a:ea typeface="Calibri" panose="020F0502020204030204" pitchFamily="34" charset="0"/>
+                <a:cs typeface="Arial" panose="020B0604020202020204" pitchFamily="34" charset="0"/>
+              </a:rPr>
+              <a:t> should each “cache” the current version of the storage per contract</a:t>
+            </a:r>
+          </a:p>
+          <a:p>
+            <a:pPr lvl="0" algn="just">
+              <a:lnSpc>
+                <a:spcPct val="107000"/>
+              </a:lnSpc>
+              <a:spcAft>
+                <a:spcPts val="800"/>
+              </a:spcAft>
+            </a:pPr>
+            <a:r>
+              <a:rPr lang="en-GB" dirty="0">
+                <a:solidFill>
+                  <a:schemeClr val="tx1">
+                    <a:lumMod val="65000"/>
+                    <a:lumOff val="35000"/>
+                  </a:schemeClr>
+                </a:solidFill>
+                <a:ea typeface="Calibri" panose="020F0502020204030204" pitchFamily="34" charset="0"/>
+                <a:cs typeface="Arial" panose="020B0604020202020204" pitchFamily="34" charset="0"/>
+              </a:rPr>
+              <a:t>Because rebuilding </a:t>
+            </a:r>
+          </a:p>
+        </p:txBody>
+      </p:sp>
+    </p:spTree>
+    <p:extLst>
+      <p:ext uri="{BB962C8B-B14F-4D97-AF65-F5344CB8AC3E}">
+        <p14:creationId xmlns:p14="http://schemas.microsoft.com/office/powerpoint/2010/main" val="899510075"/>
       </p:ext>
     </p:extLst>
   </p:cSld>
@@ -12131,225 +13295,17 @@
               </a:spcAft>
             </a:pPr>
             <a:r>
-              <a:rPr lang="fr-FR" dirty="0">
-                <a:solidFill>
-                  <a:schemeClr val="tx1">
-                    <a:lumMod val="65000"/>
-                    <a:lumOff val="35000"/>
-                  </a:schemeClr>
-                </a:solidFill>
-                <a:ea typeface="Calibri" panose="020F0502020204030204" pitchFamily="34" charset="0"/>
-                <a:cs typeface="Arial" panose="020B0604020202020204" pitchFamily="34" charset="0"/>
-              </a:rPr>
-              <a:t>There are </a:t>
-            </a:r>
-            <a:r>
-              <a:rPr lang="fr-FR" dirty="0" err="1">
-                <a:solidFill>
-                  <a:schemeClr val="tx1">
-                    <a:lumMod val="65000"/>
-                    <a:lumOff val="35000"/>
-                  </a:schemeClr>
-                </a:solidFill>
-                <a:ea typeface="Calibri" panose="020F0502020204030204" pitchFamily="34" charset="0"/>
-                <a:cs typeface="Arial" panose="020B0604020202020204" pitchFamily="34" charset="0"/>
-              </a:rPr>
-              <a:t>three</a:t>
-            </a:r>
-            <a:r>
-              <a:rPr lang="fr-FR" dirty="0">
-                <a:solidFill>
-                  <a:schemeClr val="tx1">
-                    <a:lumMod val="65000"/>
-                    <a:lumOff val="35000"/>
-                  </a:schemeClr>
-                </a:solidFill>
-                <a:ea typeface="Calibri" panose="020F0502020204030204" pitchFamily="34" charset="0"/>
-                <a:cs typeface="Arial" panose="020B0604020202020204" pitchFamily="34" charset="0"/>
-              </a:rPr>
-              <a:t> main </a:t>
-            </a:r>
-            <a:r>
-              <a:rPr lang="fr-FR" dirty="0" err="1">
-                <a:solidFill>
-                  <a:schemeClr val="tx1">
-                    <a:lumMod val="65000"/>
-                    <a:lumOff val="35000"/>
-                  </a:schemeClr>
-                </a:solidFill>
-                <a:ea typeface="Calibri" panose="020F0502020204030204" pitchFamily="34" charset="0"/>
-                <a:cs typeface="Arial" panose="020B0604020202020204" pitchFamily="34" charset="0"/>
-              </a:rPr>
-              <a:t>numeric</a:t>
-            </a:r>
-            <a:r>
-              <a:rPr lang="fr-FR" dirty="0">
-                <a:solidFill>
-                  <a:schemeClr val="tx1">
-                    <a:lumMod val="65000"/>
-                    <a:lumOff val="35000"/>
-                  </a:schemeClr>
-                </a:solidFill>
-                <a:ea typeface="Calibri" panose="020F0502020204030204" pitchFamily="34" charset="0"/>
-                <a:cs typeface="Arial" panose="020B0604020202020204" pitchFamily="34" charset="0"/>
-              </a:rPr>
-              <a:t> types in python (</a:t>
-            </a:r>
-            <a:r>
-              <a:rPr lang="fr-FR" dirty="0" err="1">
-                <a:solidFill>
-                  <a:schemeClr val="tx1">
-                    <a:lumMod val="65000"/>
-                    <a:lumOff val="35000"/>
-                  </a:schemeClr>
-                </a:solidFill>
-                <a:ea typeface="Calibri" panose="020F0502020204030204" pitchFamily="34" charset="0"/>
-                <a:cs typeface="Arial" panose="020B0604020202020204" pitchFamily="34" charset="0"/>
-              </a:rPr>
-              <a:t>excluding</a:t>
-            </a:r>
-            <a:r>
-              <a:rPr lang="fr-FR" dirty="0">
-                <a:solidFill>
-                  <a:schemeClr val="tx1">
-                    <a:lumMod val="65000"/>
-                    <a:lumOff val="35000"/>
-                  </a:schemeClr>
-                </a:solidFill>
-                <a:ea typeface="Calibri" panose="020F0502020204030204" pitchFamily="34" charset="0"/>
-                <a:cs typeface="Arial" panose="020B0604020202020204" pitchFamily="34" charset="0"/>
-              </a:rPr>
-              <a:t> </a:t>
-            </a:r>
-            <a:r>
-              <a:rPr lang="fr-FR" dirty="0" err="1">
-                <a:solidFill>
-                  <a:schemeClr val="tx1">
-                    <a:lumMod val="65000"/>
-                    <a:lumOff val="35000"/>
-                  </a:schemeClr>
-                </a:solidFill>
-                <a:ea typeface="Calibri" panose="020F0502020204030204" pitchFamily="34" charset="0"/>
-                <a:cs typeface="Arial" panose="020B0604020202020204" pitchFamily="34" charset="0"/>
-              </a:rPr>
-              <a:t>Complex</a:t>
-            </a:r>
-            <a:r>
-              <a:rPr lang="fr-FR" dirty="0">
-                <a:solidFill>
-                  <a:schemeClr val="tx1">
-                    <a:lumMod val="65000"/>
-                    <a:lumOff val="35000"/>
-                  </a:schemeClr>
-                </a:solidFill>
-                <a:ea typeface="Calibri" panose="020F0502020204030204" pitchFamily="34" charset="0"/>
-                <a:cs typeface="Arial" panose="020B0604020202020204" pitchFamily="34" charset="0"/>
-              </a:rPr>
-              <a:t> </a:t>
-            </a:r>
-            <a:r>
-              <a:rPr lang="fr-FR" dirty="0" err="1">
-                <a:solidFill>
-                  <a:schemeClr val="tx1">
-                    <a:lumMod val="65000"/>
-                    <a:lumOff val="35000"/>
-                  </a:schemeClr>
-                </a:solidFill>
-                <a:ea typeface="Calibri" panose="020F0502020204030204" pitchFamily="34" charset="0"/>
-                <a:cs typeface="Arial" panose="020B0604020202020204" pitchFamily="34" charset="0"/>
-              </a:rPr>
-              <a:t>which</a:t>
-            </a:r>
-            <a:r>
-              <a:rPr lang="fr-FR" dirty="0">
-                <a:solidFill>
-                  <a:schemeClr val="tx1">
-                    <a:lumMod val="65000"/>
-                    <a:lumOff val="35000"/>
-                  </a:schemeClr>
-                </a:solidFill>
-                <a:ea typeface="Calibri" panose="020F0502020204030204" pitchFamily="34" charset="0"/>
-                <a:cs typeface="Arial" panose="020B0604020202020204" pitchFamily="34" charset="0"/>
-              </a:rPr>
-              <a:t> </a:t>
-            </a:r>
-            <a:r>
-              <a:rPr lang="fr-FR" dirty="0" err="1">
-                <a:solidFill>
-                  <a:schemeClr val="tx1">
-                    <a:lumMod val="65000"/>
-                    <a:lumOff val="35000"/>
-                  </a:schemeClr>
-                </a:solidFill>
-                <a:ea typeface="Calibri" panose="020F0502020204030204" pitchFamily="34" charset="0"/>
-                <a:cs typeface="Arial" panose="020B0604020202020204" pitchFamily="34" charset="0"/>
-              </a:rPr>
-              <a:t>is</a:t>
-            </a:r>
-            <a:r>
-              <a:rPr lang="fr-FR" dirty="0">
-                <a:solidFill>
-                  <a:schemeClr val="tx1">
-                    <a:lumMod val="65000"/>
-                    <a:lumOff val="35000"/>
-                  </a:schemeClr>
-                </a:solidFill>
-                <a:ea typeface="Calibri" panose="020F0502020204030204" pitchFamily="34" charset="0"/>
-                <a:cs typeface="Arial" panose="020B0604020202020204" pitchFamily="34" charset="0"/>
-              </a:rPr>
-              <a:t> out of </a:t>
-            </a:r>
-            <a:r>
-              <a:rPr lang="fr-FR" dirty="0" err="1">
-                <a:solidFill>
-                  <a:schemeClr val="tx1">
-                    <a:lumMod val="65000"/>
-                    <a:lumOff val="35000"/>
-                  </a:schemeClr>
-                </a:solidFill>
-                <a:ea typeface="Calibri" panose="020F0502020204030204" pitchFamily="34" charset="0"/>
-                <a:cs typeface="Arial" panose="020B0604020202020204" pitchFamily="34" charset="0"/>
-              </a:rPr>
-              <a:t>bounds</a:t>
-            </a:r>
-            <a:r>
-              <a:rPr lang="fr-FR" dirty="0">
-                <a:solidFill>
-                  <a:schemeClr val="tx1">
-                    <a:lumMod val="65000"/>
-                    <a:lumOff val="35000"/>
-                  </a:schemeClr>
-                </a:solidFill>
-                <a:ea typeface="Calibri" panose="020F0502020204030204" pitchFamily="34" charset="0"/>
-                <a:cs typeface="Arial" panose="020B0604020202020204" pitchFamily="34" charset="0"/>
-              </a:rPr>
-              <a:t> </a:t>
-            </a:r>
-            <a:r>
-              <a:rPr lang="fr-FR" dirty="0" err="1">
-                <a:solidFill>
-                  <a:schemeClr val="tx1">
-                    <a:lumMod val="65000"/>
-                    <a:lumOff val="35000"/>
-                  </a:schemeClr>
-                </a:solidFill>
-                <a:ea typeface="Calibri" panose="020F0502020204030204" pitchFamily="34" charset="0"/>
-                <a:cs typeface="Arial" panose="020B0604020202020204" pitchFamily="34" charset="0"/>
-              </a:rPr>
-              <a:t>here</a:t>
-            </a:r>
-            <a:r>
-              <a:rPr lang="fr-FR" dirty="0">
-                <a:solidFill>
-                  <a:schemeClr val="tx1">
-                    <a:lumMod val="65000"/>
-                    <a:lumOff val="35000"/>
-                  </a:schemeClr>
-                </a:solidFill>
-                <a:ea typeface="Calibri" panose="020F0502020204030204" pitchFamily="34" charset="0"/>
-                <a:cs typeface="Arial" panose="020B0604020202020204" pitchFamily="34" charset="0"/>
-              </a:rPr>
-              <a:t>):</a:t>
+              <a:rPr lang="en-GB" dirty="0">
+                <a:solidFill>
+                  <a:schemeClr val="tx1">
+                    <a:lumMod val="65000"/>
+                    <a:lumOff val="35000"/>
+                  </a:schemeClr>
+                </a:solidFill>
+                <a:ea typeface="Calibri" panose="020F0502020204030204" pitchFamily="34" charset="0"/>
+                <a:cs typeface="Arial" panose="020B0604020202020204" pitchFamily="34" charset="0"/>
+              </a:rPr>
+              <a:t>There are three main numeric types in python (excluding Complex which is out of bounds here):</a:t>
             </a:r>
           </a:p>
           <a:p>
@@ -12364,7 +13320,7 @@
               <a:buChar char="•"/>
             </a:pPr>
             <a:r>
-              <a:rPr lang="fr-FR" b="1" dirty="0" err="1">
+              <a:rPr lang="en-GB" b="1" dirty="0" err="1">
                 <a:solidFill>
                   <a:schemeClr val="tx1">
                     <a:lumMod val="65000"/>
@@ -12377,7 +13333,7 @@
               <a:t>int</a:t>
             </a:r>
             <a:r>
-              <a:rPr lang="fr-FR" b="1" dirty="0">
+              <a:rPr lang="en-GB" b="1" dirty="0">
                 <a:solidFill>
                   <a:schemeClr val="tx1">
                     <a:lumMod val="65000"/>
@@ -12390,340 +13346,44 @@
               <a:t>: </a:t>
             </a:r>
             <a:r>
-              <a:rPr lang="fr-FR" dirty="0" err="1">
-                <a:solidFill>
-                  <a:schemeClr val="tx1">
-                    <a:lumMod val="65000"/>
-                    <a:lumOff val="35000"/>
-                  </a:schemeClr>
-                </a:solidFill>
-                <a:ea typeface="Calibri" panose="020F0502020204030204" pitchFamily="34" charset="0"/>
-                <a:cs typeface="Arial" panose="020B0604020202020204" pitchFamily="34" charset="0"/>
-              </a:rPr>
-              <a:t>is</a:t>
-            </a:r>
-            <a:r>
-              <a:rPr lang="fr-FR" dirty="0">
-                <a:solidFill>
-                  <a:schemeClr val="tx1">
-                    <a:lumMod val="65000"/>
-                    <a:lumOff val="35000"/>
-                  </a:schemeClr>
-                </a:solidFill>
-                <a:ea typeface="Calibri" panose="020F0502020204030204" pitchFamily="34" charset="0"/>
-                <a:cs typeface="Arial" panose="020B0604020202020204" pitchFamily="34" charset="0"/>
-              </a:rPr>
-              <a:t> the default </a:t>
-            </a:r>
-            <a:r>
-              <a:rPr lang="fr-FR" dirty="0" err="1">
-                <a:solidFill>
-                  <a:schemeClr val="tx1">
-                    <a:lumMod val="65000"/>
-                    <a:lumOff val="35000"/>
-                  </a:schemeClr>
-                </a:solidFill>
-                <a:ea typeface="Calibri" panose="020F0502020204030204" pitchFamily="34" charset="0"/>
-                <a:cs typeface="Arial" panose="020B0604020202020204" pitchFamily="34" charset="0"/>
-              </a:rPr>
-              <a:t>integer</a:t>
-            </a:r>
-            <a:r>
-              <a:rPr lang="fr-FR" dirty="0">
-                <a:solidFill>
-                  <a:schemeClr val="tx1">
-                    <a:lumMod val="65000"/>
-                    <a:lumOff val="35000"/>
-                  </a:schemeClr>
-                </a:solidFill>
-                <a:ea typeface="Calibri" panose="020F0502020204030204" pitchFamily="34" charset="0"/>
-                <a:cs typeface="Arial" panose="020B0604020202020204" pitchFamily="34" charset="0"/>
-              </a:rPr>
-              <a:t> type. It </a:t>
-            </a:r>
-            <a:r>
-              <a:rPr lang="fr-FR" dirty="0" err="1">
-                <a:solidFill>
-                  <a:schemeClr val="tx1">
-                    <a:lumMod val="65000"/>
-                    <a:lumOff val="35000"/>
-                  </a:schemeClr>
-                </a:solidFill>
-                <a:ea typeface="Calibri" panose="020F0502020204030204" pitchFamily="34" charset="0"/>
-                <a:cs typeface="Arial" panose="020B0604020202020204" pitchFamily="34" charset="0"/>
-              </a:rPr>
-              <a:t>is</a:t>
-            </a:r>
-            <a:r>
-              <a:rPr lang="fr-FR" dirty="0">
-                <a:solidFill>
-                  <a:schemeClr val="tx1">
-                    <a:lumMod val="65000"/>
-                    <a:lumOff val="35000"/>
-                  </a:schemeClr>
-                </a:solidFill>
-                <a:ea typeface="Calibri" panose="020F0502020204030204" pitchFamily="34" charset="0"/>
-                <a:cs typeface="Arial" panose="020B0604020202020204" pitchFamily="34" charset="0"/>
-              </a:rPr>
-              <a:t> the </a:t>
-            </a:r>
-            <a:r>
-              <a:rPr lang="fr-FR" dirty="0" err="1">
-                <a:solidFill>
-                  <a:schemeClr val="tx1">
-                    <a:lumMod val="65000"/>
-                    <a:lumOff val="35000"/>
-                  </a:schemeClr>
-                </a:solidFill>
-                <a:ea typeface="Calibri" panose="020F0502020204030204" pitchFamily="34" charset="0"/>
-                <a:cs typeface="Arial" panose="020B0604020202020204" pitchFamily="34" charset="0"/>
-              </a:rPr>
-              <a:t>most</a:t>
-            </a:r>
-            <a:r>
-              <a:rPr lang="fr-FR" dirty="0">
-                <a:solidFill>
-                  <a:schemeClr val="tx1">
-                    <a:lumMod val="65000"/>
-                    <a:lumOff val="35000"/>
-                  </a:schemeClr>
-                </a:solidFill>
-                <a:ea typeface="Calibri" panose="020F0502020204030204" pitchFamily="34" charset="0"/>
-                <a:cs typeface="Arial" panose="020B0604020202020204" pitchFamily="34" charset="0"/>
-              </a:rPr>
-              <a:t> performant to </a:t>
-            </a:r>
-            <a:r>
-              <a:rPr lang="fr-FR" dirty="0" err="1">
-                <a:solidFill>
-                  <a:schemeClr val="tx1">
-                    <a:lumMod val="65000"/>
-                    <a:lumOff val="35000"/>
-                  </a:schemeClr>
-                </a:solidFill>
-                <a:ea typeface="Calibri" panose="020F0502020204030204" pitchFamily="34" charset="0"/>
-                <a:cs typeface="Arial" panose="020B0604020202020204" pitchFamily="34" charset="0"/>
-              </a:rPr>
-              <a:t>handle</a:t>
-            </a:r>
-            <a:r>
-              <a:rPr lang="fr-FR" dirty="0">
-                <a:solidFill>
-                  <a:schemeClr val="tx1">
-                    <a:lumMod val="65000"/>
-                    <a:lumOff val="35000"/>
-                  </a:schemeClr>
-                </a:solidFill>
-                <a:ea typeface="Calibri" panose="020F0502020204030204" pitchFamily="34" charset="0"/>
-                <a:cs typeface="Arial" panose="020B0604020202020204" pitchFamily="34" charset="0"/>
-              </a:rPr>
-              <a:t>. In Python, </a:t>
-            </a:r>
-            <a:r>
-              <a:rPr lang="fr-FR" b="1" dirty="0" err="1">
-                <a:solidFill>
-                  <a:schemeClr val="tx1">
-                    <a:lumMod val="65000"/>
-                    <a:lumOff val="35000"/>
-                  </a:schemeClr>
-                </a:solidFill>
-                <a:ea typeface="Calibri" panose="020F0502020204030204" pitchFamily="34" charset="0"/>
-                <a:cs typeface="Arial" panose="020B0604020202020204" pitchFamily="34" charset="0"/>
-              </a:rPr>
-              <a:t>it</a:t>
-            </a:r>
-            <a:r>
-              <a:rPr lang="fr-FR" b="1" dirty="0">
-                <a:solidFill>
-                  <a:schemeClr val="tx1">
-                    <a:lumMod val="65000"/>
-                    <a:lumOff val="35000"/>
-                  </a:schemeClr>
-                </a:solidFill>
-                <a:ea typeface="Calibri" panose="020F0502020204030204" pitchFamily="34" charset="0"/>
-                <a:cs typeface="Arial" panose="020B0604020202020204" pitchFamily="34" charset="0"/>
-              </a:rPr>
-              <a:t> </a:t>
-            </a:r>
-            <a:r>
-              <a:rPr lang="fr-FR" b="1" dirty="0" err="1">
-                <a:solidFill>
-                  <a:schemeClr val="tx1">
-                    <a:lumMod val="65000"/>
-                    <a:lumOff val="35000"/>
-                  </a:schemeClr>
-                </a:solidFill>
-                <a:ea typeface="Calibri" panose="020F0502020204030204" pitchFamily="34" charset="0"/>
-                <a:cs typeface="Arial" panose="020B0604020202020204" pitchFamily="34" charset="0"/>
-              </a:rPr>
-              <a:t>is</a:t>
-            </a:r>
-            <a:r>
-              <a:rPr lang="fr-FR" b="1" dirty="0">
-                <a:solidFill>
-                  <a:schemeClr val="tx1">
-                    <a:lumMod val="65000"/>
-                    <a:lumOff val="35000"/>
-                  </a:schemeClr>
-                </a:solidFill>
-                <a:ea typeface="Calibri" panose="020F0502020204030204" pitchFamily="34" charset="0"/>
-                <a:cs typeface="Arial" panose="020B0604020202020204" pitchFamily="34" charset="0"/>
-              </a:rPr>
-              <a:t> not </a:t>
-            </a:r>
-            <a:r>
-              <a:rPr lang="fr-FR" b="1" dirty="0" err="1">
-                <a:solidFill>
-                  <a:schemeClr val="tx1">
-                    <a:lumMod val="65000"/>
-                    <a:lumOff val="35000"/>
-                  </a:schemeClr>
-                </a:solidFill>
-                <a:ea typeface="Calibri" panose="020F0502020204030204" pitchFamily="34" charset="0"/>
-                <a:cs typeface="Arial" panose="020B0604020202020204" pitchFamily="34" charset="0"/>
-              </a:rPr>
-              <a:t>bounded</a:t>
-            </a:r>
-            <a:r>
-              <a:rPr lang="fr-FR" b="1" dirty="0">
-                <a:solidFill>
-                  <a:schemeClr val="tx1">
-                    <a:lumMod val="65000"/>
-                    <a:lumOff val="35000"/>
-                  </a:schemeClr>
-                </a:solidFill>
-                <a:ea typeface="Calibri" panose="020F0502020204030204" pitchFamily="34" charset="0"/>
-                <a:cs typeface="Arial" panose="020B0604020202020204" pitchFamily="34" charset="0"/>
-              </a:rPr>
-              <a:t>, </a:t>
-            </a:r>
-            <a:r>
-              <a:rPr lang="fr-FR" dirty="0" err="1">
-                <a:solidFill>
-                  <a:schemeClr val="tx1">
-                    <a:lumMod val="65000"/>
-                    <a:lumOff val="35000"/>
-                  </a:schemeClr>
-                </a:solidFill>
-                <a:ea typeface="Calibri" panose="020F0502020204030204" pitchFamily="34" charset="0"/>
-                <a:cs typeface="Arial" panose="020B0604020202020204" pitchFamily="34" charset="0"/>
-              </a:rPr>
-              <a:t>e.g</a:t>
-            </a:r>
-            <a:r>
-              <a:rPr lang="fr-FR" dirty="0">
-                <a:solidFill>
-                  <a:schemeClr val="tx1">
-                    <a:lumMod val="65000"/>
-                    <a:lumOff val="35000"/>
-                  </a:schemeClr>
-                </a:solidFill>
-                <a:ea typeface="Calibri" panose="020F0502020204030204" pitchFamily="34" charset="0"/>
-                <a:cs typeface="Arial" panose="020B0604020202020204" pitchFamily="34" charset="0"/>
-              </a:rPr>
-              <a:t>. </a:t>
-            </a:r>
-            <a:r>
-              <a:rPr lang="fr-FR" dirty="0" err="1">
-                <a:solidFill>
-                  <a:schemeClr val="tx1">
-                    <a:lumMod val="65000"/>
-                    <a:lumOff val="35000"/>
-                  </a:schemeClr>
-                </a:solidFill>
-                <a:ea typeface="Calibri" panose="020F0502020204030204" pitchFamily="34" charset="0"/>
-                <a:cs typeface="Arial" panose="020B0604020202020204" pitchFamily="34" charset="0"/>
-              </a:rPr>
-              <a:t>you</a:t>
-            </a:r>
-            <a:r>
-              <a:rPr lang="fr-FR" dirty="0">
-                <a:solidFill>
-                  <a:schemeClr val="tx1">
-                    <a:lumMod val="65000"/>
-                    <a:lumOff val="35000"/>
-                  </a:schemeClr>
-                </a:solidFill>
-                <a:ea typeface="Calibri" panose="020F0502020204030204" pitchFamily="34" charset="0"/>
-                <a:cs typeface="Arial" panose="020B0604020202020204" pitchFamily="34" charset="0"/>
-              </a:rPr>
-              <a:t> </a:t>
-            </a:r>
-            <a:r>
-              <a:rPr lang="fr-FR" dirty="0" err="1">
-                <a:solidFill>
-                  <a:schemeClr val="tx1">
-                    <a:lumMod val="65000"/>
-                    <a:lumOff val="35000"/>
-                  </a:schemeClr>
-                </a:solidFill>
-                <a:ea typeface="Calibri" panose="020F0502020204030204" pitchFamily="34" charset="0"/>
-                <a:cs typeface="Arial" panose="020B0604020202020204" pitchFamily="34" charset="0"/>
-              </a:rPr>
-              <a:t>can</a:t>
-            </a:r>
-            <a:r>
-              <a:rPr lang="fr-FR" dirty="0">
-                <a:solidFill>
-                  <a:schemeClr val="tx1">
-                    <a:lumMod val="65000"/>
-                    <a:lumOff val="35000"/>
-                  </a:schemeClr>
-                </a:solidFill>
-                <a:ea typeface="Calibri" panose="020F0502020204030204" pitchFamily="34" charset="0"/>
-                <a:cs typeface="Arial" panose="020B0604020202020204" pitchFamily="34" charset="0"/>
-              </a:rPr>
-              <a:t> have an </a:t>
-            </a:r>
-            <a:r>
-              <a:rPr lang="fr-FR" dirty="0" err="1">
-                <a:solidFill>
-                  <a:schemeClr val="tx1">
-                    <a:lumMod val="65000"/>
-                    <a:lumOff val="35000"/>
-                  </a:schemeClr>
-                </a:solidFill>
-                <a:ea typeface="Calibri" panose="020F0502020204030204" pitchFamily="34" charset="0"/>
-                <a:cs typeface="Arial" panose="020B0604020202020204" pitchFamily="34" charset="0"/>
-              </a:rPr>
-              <a:t>infinitely</a:t>
-            </a:r>
-            <a:r>
-              <a:rPr lang="fr-FR" dirty="0">
-                <a:solidFill>
-                  <a:schemeClr val="tx1">
-                    <a:lumMod val="65000"/>
-                    <a:lumOff val="35000"/>
-                  </a:schemeClr>
-                </a:solidFill>
-                <a:ea typeface="Calibri" panose="020F0502020204030204" pitchFamily="34" charset="0"/>
-                <a:cs typeface="Arial" panose="020B0604020202020204" pitchFamily="34" charset="0"/>
-              </a:rPr>
-              <a:t> long </a:t>
-            </a:r>
-            <a:r>
-              <a:rPr lang="fr-FR" dirty="0" err="1">
-                <a:solidFill>
-                  <a:schemeClr val="tx1">
-                    <a:lumMod val="65000"/>
-                    <a:lumOff val="35000"/>
-                  </a:schemeClr>
-                </a:solidFill>
-                <a:ea typeface="Calibri" panose="020F0502020204030204" pitchFamily="34" charset="0"/>
-                <a:cs typeface="Arial" panose="020B0604020202020204" pitchFamily="34" charset="0"/>
-              </a:rPr>
-              <a:t>integer</a:t>
-            </a:r>
-            <a:endParaRPr lang="fr-FR" dirty="0">
-              <a:solidFill>
-                <a:schemeClr val="tx1">
-                  <a:lumMod val="65000"/>
-                  <a:lumOff val="35000"/>
-                </a:schemeClr>
-              </a:solidFill>
-              <a:ea typeface="Calibri" panose="020F0502020204030204" pitchFamily="34" charset="0"/>
-              <a:cs typeface="Arial" panose="020B0604020202020204" pitchFamily="34" charset="0"/>
-            </a:endParaRPr>
+              <a:rPr lang="en-GB" dirty="0">
+                <a:solidFill>
+                  <a:schemeClr val="tx1">
+                    <a:lumMod val="65000"/>
+                    <a:lumOff val="35000"/>
+                  </a:schemeClr>
+                </a:solidFill>
+                <a:ea typeface="Calibri" panose="020F0502020204030204" pitchFamily="34" charset="0"/>
+                <a:cs typeface="Arial" panose="020B0604020202020204" pitchFamily="34" charset="0"/>
+              </a:rPr>
+              <a:t>is the default integer type. It is the most performant to handle. In Python, </a:t>
+            </a:r>
+            <a:r>
+              <a:rPr lang="en-GB" b="1" dirty="0">
+                <a:solidFill>
+                  <a:schemeClr val="tx1">
+                    <a:lumMod val="65000"/>
+                    <a:lumOff val="35000"/>
+                  </a:schemeClr>
+                </a:solidFill>
+                <a:ea typeface="Calibri" panose="020F0502020204030204" pitchFamily="34" charset="0"/>
+                <a:cs typeface="Arial" panose="020B0604020202020204" pitchFamily="34" charset="0"/>
+              </a:rPr>
+              <a:t>it is not bounded, </a:t>
+            </a:r>
+            <a:r>
+              <a:rPr lang="en-GB" dirty="0">
+                <a:solidFill>
+                  <a:schemeClr val="tx1">
+                    <a:lumMod val="65000"/>
+                    <a:lumOff val="35000"/>
+                  </a:schemeClr>
+                </a:solidFill>
+                <a:ea typeface="Calibri" panose="020F0502020204030204" pitchFamily="34" charset="0"/>
+                <a:cs typeface="Arial" panose="020B0604020202020204" pitchFamily="34" charset="0"/>
+              </a:rPr>
+              <a:t>e.g. you can have an infinitely long integer</a:t>
+            </a:r>
           </a:p>
           <a:p>
             <a:pPr marL="285750" lvl="0" indent="-285750" algn="just">
@@ -12737,212 +13397,30 @@
               <a:buChar char="•"/>
             </a:pPr>
             <a:r>
-              <a:rPr lang="fr-FR" b="1" dirty="0" err="1">
-                <a:solidFill>
-                  <a:schemeClr val="tx1">
-                    <a:lumMod val="65000"/>
-                    <a:lumOff val="35000"/>
-                  </a:schemeClr>
-                </a:solidFill>
-                <a:ea typeface="Calibri" panose="020F0502020204030204" pitchFamily="34" charset="0"/>
-                <a:cs typeface="Arial" panose="020B0604020202020204" pitchFamily="34" charset="0"/>
-              </a:rPr>
-              <a:t>float</a:t>
-            </a:r>
-            <a:r>
-              <a:rPr lang="fr-FR" b="1" dirty="0">
-                <a:solidFill>
-                  <a:schemeClr val="tx1">
-                    <a:lumMod val="65000"/>
-                    <a:lumOff val="35000"/>
-                  </a:schemeClr>
-                </a:solidFill>
-                <a:ea typeface="Calibri" panose="020F0502020204030204" pitchFamily="34" charset="0"/>
-                <a:cs typeface="Arial" panose="020B0604020202020204" pitchFamily="34" charset="0"/>
-              </a:rPr>
-              <a:t>: </a:t>
-            </a:r>
-            <a:r>
-              <a:rPr lang="fr-FR" dirty="0" err="1">
-                <a:solidFill>
-                  <a:schemeClr val="tx1">
-                    <a:lumMod val="65000"/>
-                    <a:lumOff val="35000"/>
-                  </a:schemeClr>
-                </a:solidFill>
-                <a:ea typeface="Calibri" panose="020F0502020204030204" pitchFamily="34" charset="0"/>
-                <a:cs typeface="Arial" panose="020B0604020202020204" pitchFamily="34" charset="0"/>
-              </a:rPr>
-              <a:t>is</a:t>
-            </a:r>
-            <a:r>
-              <a:rPr lang="fr-FR" dirty="0">
-                <a:solidFill>
-                  <a:schemeClr val="tx1">
-                    <a:lumMod val="65000"/>
-                    <a:lumOff val="35000"/>
-                  </a:schemeClr>
-                </a:solidFill>
-                <a:ea typeface="Calibri" panose="020F0502020204030204" pitchFamily="34" charset="0"/>
-                <a:cs typeface="Arial" panose="020B0604020202020204" pitchFamily="34" charset="0"/>
-              </a:rPr>
-              <a:t> the default </a:t>
-            </a:r>
-            <a:r>
-              <a:rPr lang="fr-FR" dirty="0" err="1">
-                <a:solidFill>
-                  <a:schemeClr val="tx1">
-                    <a:lumMod val="65000"/>
-                    <a:lumOff val="35000"/>
-                  </a:schemeClr>
-                </a:solidFill>
-                <a:ea typeface="Calibri" panose="020F0502020204030204" pitchFamily="34" charset="0"/>
-                <a:cs typeface="Arial" panose="020B0604020202020204" pitchFamily="34" charset="0"/>
-              </a:rPr>
-              <a:t>floating</a:t>
-            </a:r>
-            <a:r>
-              <a:rPr lang="fr-FR" dirty="0">
-                <a:solidFill>
-                  <a:schemeClr val="tx1">
-                    <a:lumMod val="65000"/>
-                    <a:lumOff val="35000"/>
-                  </a:schemeClr>
-                </a:solidFill>
-                <a:ea typeface="Calibri" panose="020F0502020204030204" pitchFamily="34" charset="0"/>
-                <a:cs typeface="Arial" panose="020B0604020202020204" pitchFamily="34" charset="0"/>
-              </a:rPr>
-              <a:t> point type (64 bytes). Great to </a:t>
-            </a:r>
-            <a:r>
-              <a:rPr lang="fr-FR" dirty="0" err="1">
-                <a:solidFill>
-                  <a:schemeClr val="tx1">
-                    <a:lumMod val="65000"/>
-                    <a:lumOff val="35000"/>
-                  </a:schemeClr>
-                </a:solidFill>
-                <a:ea typeface="Calibri" panose="020F0502020204030204" pitchFamily="34" charset="0"/>
-                <a:cs typeface="Arial" panose="020B0604020202020204" pitchFamily="34" charset="0"/>
-              </a:rPr>
-              <a:t>handle</a:t>
-            </a:r>
-            <a:r>
-              <a:rPr lang="fr-FR" dirty="0">
-                <a:solidFill>
-                  <a:schemeClr val="tx1">
-                    <a:lumMod val="65000"/>
-                    <a:lumOff val="35000"/>
-                  </a:schemeClr>
-                </a:solidFill>
-                <a:ea typeface="Calibri" panose="020F0502020204030204" pitchFamily="34" charset="0"/>
-                <a:cs typeface="Arial" panose="020B0604020202020204" pitchFamily="34" charset="0"/>
-              </a:rPr>
-              <a:t> </a:t>
-            </a:r>
-            <a:r>
-              <a:rPr lang="fr-FR" dirty="0" err="1">
-                <a:solidFill>
-                  <a:schemeClr val="tx1">
-                    <a:lumMod val="65000"/>
-                    <a:lumOff val="35000"/>
-                  </a:schemeClr>
-                </a:solidFill>
-                <a:ea typeface="Calibri" panose="020F0502020204030204" pitchFamily="34" charset="0"/>
-                <a:cs typeface="Arial" panose="020B0604020202020204" pitchFamily="34" charset="0"/>
-              </a:rPr>
-              <a:t>decimals</a:t>
-            </a:r>
-            <a:r>
-              <a:rPr lang="fr-FR" dirty="0">
-                <a:solidFill>
-                  <a:schemeClr val="tx1">
-                    <a:lumMod val="65000"/>
-                    <a:lumOff val="35000"/>
-                  </a:schemeClr>
-                </a:solidFill>
-                <a:ea typeface="Calibri" panose="020F0502020204030204" pitchFamily="34" charset="0"/>
-                <a:cs typeface="Arial" panose="020B0604020202020204" pitchFamily="34" charset="0"/>
-              </a:rPr>
-              <a:t> as long as the </a:t>
-            </a:r>
-            <a:r>
-              <a:rPr lang="fr-FR" dirty="0" err="1">
-                <a:solidFill>
-                  <a:schemeClr val="tx1">
-                    <a:lumMod val="65000"/>
-                    <a:lumOff val="35000"/>
-                  </a:schemeClr>
-                </a:solidFill>
-                <a:ea typeface="Calibri" panose="020F0502020204030204" pitchFamily="34" charset="0"/>
-                <a:cs typeface="Arial" panose="020B0604020202020204" pitchFamily="34" charset="0"/>
-              </a:rPr>
-              <a:t>precision</a:t>
-            </a:r>
-            <a:r>
-              <a:rPr lang="fr-FR" dirty="0">
-                <a:solidFill>
-                  <a:schemeClr val="tx1">
-                    <a:lumMod val="65000"/>
-                    <a:lumOff val="35000"/>
-                  </a:schemeClr>
-                </a:solidFill>
-                <a:ea typeface="Calibri" panose="020F0502020204030204" pitchFamily="34" charset="0"/>
-                <a:cs typeface="Arial" panose="020B0604020202020204" pitchFamily="34" charset="0"/>
-              </a:rPr>
-              <a:t> </a:t>
-            </a:r>
-            <a:r>
-              <a:rPr lang="fr-FR" dirty="0" err="1">
-                <a:solidFill>
-                  <a:schemeClr val="tx1">
-                    <a:lumMod val="65000"/>
-                    <a:lumOff val="35000"/>
-                  </a:schemeClr>
-                </a:solidFill>
-                <a:ea typeface="Calibri" panose="020F0502020204030204" pitchFamily="34" charset="0"/>
-                <a:cs typeface="Arial" panose="020B0604020202020204" pitchFamily="34" charset="0"/>
-              </a:rPr>
-              <a:t>is</a:t>
-            </a:r>
-            <a:r>
-              <a:rPr lang="fr-FR" dirty="0">
-                <a:solidFill>
-                  <a:schemeClr val="tx1">
-                    <a:lumMod val="65000"/>
-                    <a:lumOff val="35000"/>
-                  </a:schemeClr>
-                </a:solidFill>
-                <a:ea typeface="Calibri" panose="020F0502020204030204" pitchFamily="34" charset="0"/>
-                <a:cs typeface="Arial" panose="020B0604020202020204" pitchFamily="34" charset="0"/>
-              </a:rPr>
-              <a:t> not </a:t>
-            </a:r>
-            <a:r>
-              <a:rPr lang="fr-FR" dirty="0" err="1">
-                <a:solidFill>
-                  <a:schemeClr val="tx1">
-                    <a:lumMod val="65000"/>
-                    <a:lumOff val="35000"/>
-                  </a:schemeClr>
-                </a:solidFill>
-                <a:ea typeface="Calibri" panose="020F0502020204030204" pitchFamily="34" charset="0"/>
-                <a:cs typeface="Arial" panose="020B0604020202020204" pitchFamily="34" charset="0"/>
-              </a:rPr>
-              <a:t>critical</a:t>
-            </a:r>
-            <a:r>
-              <a:rPr lang="fr-FR" dirty="0">
-                <a:solidFill>
-                  <a:schemeClr val="tx1">
-                    <a:lumMod val="65000"/>
-                    <a:lumOff val="35000"/>
-                  </a:schemeClr>
-                </a:solidFill>
-                <a:ea typeface="Calibri" panose="020F0502020204030204" pitchFamily="34" charset="0"/>
-                <a:cs typeface="Arial" panose="020B0604020202020204" pitchFamily="34" charset="0"/>
-              </a:rPr>
-              <a:t>:</a:t>
+              <a:rPr lang="en-GB" b="1" dirty="0">
+                <a:solidFill>
+                  <a:schemeClr val="tx1">
+                    <a:lumMod val="65000"/>
+                    <a:lumOff val="35000"/>
+                  </a:schemeClr>
+                </a:solidFill>
+                <a:ea typeface="Calibri" panose="020F0502020204030204" pitchFamily="34" charset="0"/>
+                <a:cs typeface="Arial" panose="020B0604020202020204" pitchFamily="34" charset="0"/>
+              </a:rPr>
+              <a:t>float: </a:t>
+            </a:r>
+            <a:r>
+              <a:rPr lang="en-GB" dirty="0">
+                <a:solidFill>
+                  <a:schemeClr val="tx1">
+                    <a:lumMod val="65000"/>
+                    <a:lumOff val="35000"/>
+                  </a:schemeClr>
+                </a:solidFill>
+                <a:ea typeface="Calibri" panose="020F0502020204030204" pitchFamily="34" charset="0"/>
+                <a:cs typeface="Arial" panose="020B0604020202020204" pitchFamily="34" charset="0"/>
+              </a:rPr>
+              <a:t>is the default floating point type (64 bytes). Great to handle decimals as long as the precision is not critical:</a:t>
             </a:r>
           </a:p>
           <a:p>
@@ -12956,7 +13434,7 @@
               <a:buFont typeface="Arial" panose="020B0604020202020204" pitchFamily="34" charset="0"/>
               <a:buChar char="•"/>
             </a:pPr>
-            <a:endParaRPr lang="fr-FR" dirty="0">
+            <a:endParaRPr lang="en-GB" dirty="0">
               <a:solidFill>
                 <a:schemeClr val="tx1">
                   <a:lumMod val="65000"/>
@@ -12978,7 +13456,7 @@
               <a:buFont typeface="Arial" panose="020B0604020202020204" pitchFamily="34" charset="0"/>
               <a:buChar char="•"/>
             </a:pPr>
-            <a:endParaRPr lang="fr-FR" dirty="0">
+            <a:endParaRPr lang="en-GB" dirty="0">
               <a:solidFill>
                 <a:schemeClr val="tx1">
                   <a:lumMod val="65000"/>
@@ -13000,7 +13478,7 @@
               <a:buFont typeface="Arial" panose="020B0604020202020204" pitchFamily="34" charset="0"/>
               <a:buChar char="•"/>
             </a:pPr>
-            <a:endParaRPr lang="fr-FR" dirty="0">
+            <a:endParaRPr lang="en-GB" dirty="0">
               <a:solidFill>
                 <a:schemeClr val="tx1">
                   <a:lumMod val="65000"/>
@@ -13022,7 +13500,7 @@
               <a:buFont typeface="Arial" panose="020B0604020202020204" pitchFamily="34" charset="0"/>
               <a:buChar char="•"/>
             </a:pPr>
-            <a:endParaRPr lang="fr-FR" dirty="0">
+            <a:endParaRPr lang="en-GB" dirty="0">
               <a:solidFill>
                 <a:schemeClr val="tx1">
                   <a:lumMod val="65000"/>
@@ -13044,7 +13522,7 @@
               <a:buFont typeface="Arial" panose="020B0604020202020204" pitchFamily="34" charset="0"/>
               <a:buChar char="•"/>
             </a:pPr>
-            <a:endParaRPr lang="fr-FR" dirty="0">
+            <a:endParaRPr lang="en-GB" dirty="0">
               <a:solidFill>
                 <a:schemeClr val="tx1">
                   <a:lumMod val="65000"/>
@@ -13067,111 +13545,33 @@
               <a:buChar char="•"/>
             </a:pPr>
             <a:r>
-              <a:rPr lang="fr-FR" b="1" dirty="0" err="1">
-                <a:solidFill>
-                  <a:schemeClr val="tx1">
-                    <a:lumMod val="65000"/>
-                    <a:lumOff val="35000"/>
-                  </a:schemeClr>
-                </a:solidFill>
-                <a:ea typeface="Calibri" panose="020F0502020204030204" pitchFamily="34" charset="0"/>
-                <a:cs typeface="Arial" panose="020B0604020202020204" pitchFamily="34" charset="0"/>
-              </a:rPr>
-              <a:t>Decimal</a:t>
-            </a:r>
-            <a:r>
-              <a:rPr lang="fr-FR" b="1" dirty="0">
-                <a:solidFill>
-                  <a:schemeClr val="tx1">
-                    <a:lumMod val="65000"/>
-                    <a:lumOff val="35000"/>
-                  </a:schemeClr>
-                </a:solidFill>
-                <a:ea typeface="Calibri" panose="020F0502020204030204" pitchFamily="34" charset="0"/>
-                <a:cs typeface="Arial" panose="020B0604020202020204" pitchFamily="34" charset="0"/>
-              </a:rPr>
-              <a:t>: </a:t>
-            </a:r>
-            <a:r>
-              <a:rPr lang="fr-FR" dirty="0">
-                <a:solidFill>
-                  <a:schemeClr val="tx1">
-                    <a:lumMod val="65000"/>
-                    <a:lumOff val="35000"/>
-                  </a:schemeClr>
-                </a:solidFill>
-                <a:ea typeface="Calibri" panose="020F0502020204030204" pitchFamily="34" charset="0"/>
-                <a:cs typeface="Arial" panose="020B0604020202020204" pitchFamily="34" charset="0"/>
-              </a:rPr>
-              <a:t>a pure python type </a:t>
-            </a:r>
-            <a:r>
-              <a:rPr lang="fr-FR" dirty="0" err="1">
-                <a:solidFill>
-                  <a:schemeClr val="tx1">
-                    <a:lumMod val="65000"/>
-                    <a:lumOff val="35000"/>
-                  </a:schemeClr>
-                </a:solidFill>
-                <a:ea typeface="Calibri" panose="020F0502020204030204" pitchFamily="34" charset="0"/>
-                <a:cs typeface="Arial" panose="020B0604020202020204" pitchFamily="34" charset="0"/>
-              </a:rPr>
-              <a:t>dedicated</a:t>
-            </a:r>
-            <a:r>
-              <a:rPr lang="fr-FR" dirty="0">
-                <a:solidFill>
-                  <a:schemeClr val="tx1">
-                    <a:lumMod val="65000"/>
-                    <a:lumOff val="35000"/>
-                  </a:schemeClr>
-                </a:solidFill>
-                <a:ea typeface="Calibri" panose="020F0502020204030204" pitchFamily="34" charset="0"/>
-                <a:cs typeface="Arial" panose="020B0604020202020204" pitchFamily="34" charset="0"/>
-              </a:rPr>
-              <a:t> to </a:t>
-            </a:r>
-            <a:r>
-              <a:rPr lang="fr-FR" dirty="0" err="1">
-                <a:solidFill>
-                  <a:schemeClr val="tx1">
-                    <a:lumMod val="65000"/>
-                    <a:lumOff val="35000"/>
-                  </a:schemeClr>
-                </a:solidFill>
-                <a:ea typeface="Calibri" panose="020F0502020204030204" pitchFamily="34" charset="0"/>
-                <a:cs typeface="Arial" panose="020B0604020202020204" pitchFamily="34" charset="0"/>
-              </a:rPr>
-              <a:t>handle</a:t>
-            </a:r>
-            <a:r>
-              <a:rPr lang="fr-FR" dirty="0">
-                <a:solidFill>
-                  <a:schemeClr val="tx1">
-                    <a:lumMod val="65000"/>
-                    <a:lumOff val="35000"/>
-                  </a:schemeClr>
-                </a:solidFill>
-                <a:ea typeface="Calibri" panose="020F0502020204030204" pitchFamily="34" charset="0"/>
-                <a:cs typeface="Arial" panose="020B0604020202020204" pitchFamily="34" charset="0"/>
-              </a:rPr>
-              <a:t> fractions </a:t>
-            </a:r>
-            <a:r>
-              <a:rPr lang="fr-FR" dirty="0" err="1">
-                <a:solidFill>
-                  <a:schemeClr val="tx1">
-                    <a:lumMod val="65000"/>
-                    <a:lumOff val="35000"/>
-                  </a:schemeClr>
-                </a:solidFill>
-                <a:ea typeface="Calibri" panose="020F0502020204030204" pitchFamily="34" charset="0"/>
-                <a:cs typeface="Arial" panose="020B0604020202020204" pitchFamily="34" charset="0"/>
-              </a:rPr>
-              <a:t>accurately</a:t>
-            </a:r>
-            <a:r>
-              <a:rPr lang="fr-FR" b="1" dirty="0">
+              <a:rPr lang="en-GB" b="1" dirty="0">
+                <a:solidFill>
+                  <a:schemeClr val="tx1">
+                    <a:lumMod val="65000"/>
+                    <a:lumOff val="35000"/>
+                  </a:schemeClr>
+                </a:solidFill>
+                <a:ea typeface="Calibri" panose="020F0502020204030204" pitchFamily="34" charset="0"/>
+                <a:cs typeface="Arial" panose="020B0604020202020204" pitchFamily="34" charset="0"/>
+              </a:rPr>
+              <a:t>Decimal: </a:t>
+            </a:r>
+            <a:r>
+              <a:rPr lang="en-GB" dirty="0">
+                <a:solidFill>
+                  <a:schemeClr val="tx1">
+                    <a:lumMod val="65000"/>
+                    <a:lumOff val="35000"/>
+                  </a:schemeClr>
+                </a:solidFill>
+                <a:ea typeface="Calibri" panose="020F0502020204030204" pitchFamily="34" charset="0"/>
+                <a:cs typeface="Arial" panose="020B0604020202020204" pitchFamily="34" charset="0"/>
+              </a:rPr>
+              <a:t>a pure python type dedicated to handle fractions accurately</a:t>
+            </a:r>
+            <a:r>
+              <a:rPr lang="en-GB" b="1" dirty="0">
                 <a:solidFill>
                   <a:schemeClr val="tx1">
                     <a:lumMod val="65000"/>

</xml_diff>